<commit_message>
All cards arranged in rough location of final
Still need the background gif/jpg.
</commit_message>
<xml_diff>
--- a/HueHueBakersDozenSolitaire/HueHueBakersDozenSolitaireContent/Prototype.pptx
+++ b/HueHueBakersDozenSolitaire/HueHueBakersDozenSolitaireContent/Prototype.pptx
@@ -4,6 +4,9 @@
   <p:sldMasterIdLst>
     <p:sldMasterId id="2147483648" r:id="rId1"/>
   </p:sldMasterIdLst>
+  <p:notesMasterIdLst>
+    <p:notesMasterId r:id="rId3"/>
+  </p:notesMasterIdLst>
   <p:sldIdLst>
     <p:sldId id="256" r:id="rId2"/>
   </p:sldIdLst>
@@ -105,6 +108,440 @@
     </a:lvl9pPr>
   </p:defaultTextStyle>
 </p:presentation>
+</file>
+
+<file path=ppt/notesMasters/notesMaster1.xml><?xml version="1.0" encoding="utf-8"?>
+<p:notesMaster xmlns:a="http://schemas.openxmlformats.org/drawingml/2006/main" xmlns:r="http://schemas.openxmlformats.org/officeDocument/2006/relationships" xmlns:p="http://schemas.openxmlformats.org/presentationml/2006/main">
+  <p:cSld>
+    <p:bg>
+      <p:bgRef idx="1001">
+        <a:schemeClr val="bg1"/>
+      </p:bgRef>
+    </p:bg>
+    <p:spTree>
+      <p:nvGrpSpPr>
+        <p:cNvPr id="1" name=""/>
+        <p:cNvGrpSpPr/>
+        <p:nvPr/>
+      </p:nvGrpSpPr>
+      <p:grpSpPr>
+        <a:xfrm>
+          <a:off x="0" y="0"/>
+          <a:ext cx="0" cy="0"/>
+          <a:chOff x="0" y="0"/>
+          <a:chExt cx="0" cy="0"/>
+        </a:xfrm>
+      </p:grpSpPr>
+      <p:sp>
+        <p:nvSpPr>
+          <p:cNvPr id="2" name="Header Placeholder 1"/>
+          <p:cNvSpPr>
+            <a:spLocks noGrp="1"/>
+          </p:cNvSpPr>
+          <p:nvPr>
+            <p:ph type="hdr" sz="quarter"/>
+          </p:nvPr>
+        </p:nvSpPr>
+        <p:spPr>
+          <a:xfrm>
+            <a:off x="0" y="0"/>
+            <a:ext cx="2971800" cy="457200"/>
+          </a:xfrm>
+          <a:prstGeom prst="rect">
+            <a:avLst/>
+          </a:prstGeom>
+        </p:spPr>
+        <p:txBody>
+          <a:bodyPr vert="horz" lIns="91440" tIns="45720" rIns="91440" bIns="45720" rtlCol="0"/>
+          <a:lstStyle>
+            <a:lvl1pPr algn="l">
+              <a:defRPr sz="1200"/>
+            </a:lvl1pPr>
+          </a:lstStyle>
+          <a:p>
+            <a:endParaRPr lang="en-US"/>
+          </a:p>
+        </p:txBody>
+      </p:sp>
+      <p:sp>
+        <p:nvSpPr>
+          <p:cNvPr id="3" name="Date Placeholder 2"/>
+          <p:cNvSpPr>
+            <a:spLocks noGrp="1"/>
+          </p:cNvSpPr>
+          <p:nvPr>
+            <p:ph type="dt" idx="1"/>
+          </p:nvPr>
+        </p:nvSpPr>
+        <p:spPr>
+          <a:xfrm>
+            <a:off x="3884613" y="0"/>
+            <a:ext cx="2971800" cy="457200"/>
+          </a:xfrm>
+          <a:prstGeom prst="rect">
+            <a:avLst/>
+          </a:prstGeom>
+        </p:spPr>
+        <p:txBody>
+          <a:bodyPr vert="horz" lIns="91440" tIns="45720" rIns="91440" bIns="45720" rtlCol="0"/>
+          <a:lstStyle>
+            <a:lvl1pPr algn="r">
+              <a:defRPr sz="1200"/>
+            </a:lvl1pPr>
+          </a:lstStyle>
+          <a:p>
+            <a:fld id="{6236B3B6-7641-435A-B574-73CCDA61DBE3}" type="datetimeFigureOut">
+              <a:rPr lang="en-US" smtClean="0"/>
+              <a:t>10/15/2013</a:t>
+            </a:fld>
+            <a:endParaRPr lang="en-US"/>
+          </a:p>
+        </p:txBody>
+      </p:sp>
+      <p:sp>
+        <p:nvSpPr>
+          <p:cNvPr id="4" name="Slide Image Placeholder 3"/>
+          <p:cNvSpPr>
+            <a:spLocks noGrp="1" noRot="1" noChangeAspect="1"/>
+          </p:cNvSpPr>
+          <p:nvPr>
+            <p:ph type="sldImg" idx="2"/>
+          </p:nvPr>
+        </p:nvSpPr>
+        <p:spPr>
+          <a:xfrm>
+            <a:off x="381000" y="685800"/>
+            <a:ext cx="6096000" cy="3429000"/>
+          </a:xfrm>
+          <a:prstGeom prst="rect">
+            <a:avLst/>
+          </a:prstGeom>
+          <a:noFill/>
+          <a:ln w="12700">
+            <a:solidFill>
+              <a:prstClr val="black"/>
+            </a:solidFill>
+          </a:ln>
+        </p:spPr>
+        <p:txBody>
+          <a:bodyPr vert="horz" lIns="91440" tIns="45720" rIns="91440" bIns="45720" rtlCol="0" anchor="ctr"/>
+          <a:lstStyle/>
+          <a:p>
+            <a:endParaRPr lang="en-US"/>
+          </a:p>
+        </p:txBody>
+      </p:sp>
+      <p:sp>
+        <p:nvSpPr>
+          <p:cNvPr id="5" name="Notes Placeholder 4"/>
+          <p:cNvSpPr>
+            <a:spLocks noGrp="1"/>
+          </p:cNvSpPr>
+          <p:nvPr>
+            <p:ph type="body" sz="quarter" idx="3"/>
+          </p:nvPr>
+        </p:nvSpPr>
+        <p:spPr>
+          <a:xfrm>
+            <a:off x="685800" y="4343400"/>
+            <a:ext cx="5486400" cy="4114800"/>
+          </a:xfrm>
+          <a:prstGeom prst="rect">
+            <a:avLst/>
+          </a:prstGeom>
+        </p:spPr>
+        <p:txBody>
+          <a:bodyPr vert="horz" lIns="91440" tIns="45720" rIns="91440" bIns="45720" rtlCol="0"/>
+          <a:lstStyle/>
+          <a:p>
+            <a:pPr lvl="0"/>
+            <a:r>
+              <a:rPr lang="en-US" smtClean="0"/>
+              <a:t>Click to edit Master text styles</a:t>
+            </a:r>
+          </a:p>
+          <a:p>
+            <a:pPr lvl="1"/>
+            <a:r>
+              <a:rPr lang="en-US" smtClean="0"/>
+              <a:t>Second level</a:t>
+            </a:r>
+          </a:p>
+          <a:p>
+            <a:pPr lvl="2"/>
+            <a:r>
+              <a:rPr lang="en-US" smtClean="0"/>
+              <a:t>Third level</a:t>
+            </a:r>
+          </a:p>
+          <a:p>
+            <a:pPr lvl="3"/>
+            <a:r>
+              <a:rPr lang="en-US" smtClean="0"/>
+              <a:t>Fourth level</a:t>
+            </a:r>
+          </a:p>
+          <a:p>
+            <a:pPr lvl="4"/>
+            <a:r>
+              <a:rPr lang="en-US" smtClean="0"/>
+              <a:t>Fifth level</a:t>
+            </a:r>
+            <a:endParaRPr lang="en-US"/>
+          </a:p>
+        </p:txBody>
+      </p:sp>
+      <p:sp>
+        <p:nvSpPr>
+          <p:cNvPr id="6" name="Footer Placeholder 5"/>
+          <p:cNvSpPr>
+            <a:spLocks noGrp="1"/>
+          </p:cNvSpPr>
+          <p:nvPr>
+            <p:ph type="ftr" sz="quarter" idx="4"/>
+          </p:nvPr>
+        </p:nvSpPr>
+        <p:spPr>
+          <a:xfrm>
+            <a:off x="0" y="8685213"/>
+            <a:ext cx="2971800" cy="457200"/>
+          </a:xfrm>
+          <a:prstGeom prst="rect">
+            <a:avLst/>
+          </a:prstGeom>
+        </p:spPr>
+        <p:txBody>
+          <a:bodyPr vert="horz" lIns="91440" tIns="45720" rIns="91440" bIns="45720" rtlCol="0" anchor="b"/>
+          <a:lstStyle>
+            <a:lvl1pPr algn="l">
+              <a:defRPr sz="1200"/>
+            </a:lvl1pPr>
+          </a:lstStyle>
+          <a:p>
+            <a:endParaRPr lang="en-US"/>
+          </a:p>
+        </p:txBody>
+      </p:sp>
+      <p:sp>
+        <p:nvSpPr>
+          <p:cNvPr id="7" name="Slide Number Placeholder 6"/>
+          <p:cNvSpPr>
+            <a:spLocks noGrp="1"/>
+          </p:cNvSpPr>
+          <p:nvPr>
+            <p:ph type="sldNum" sz="quarter" idx="5"/>
+          </p:nvPr>
+        </p:nvSpPr>
+        <p:spPr>
+          <a:xfrm>
+            <a:off x="3884613" y="8685213"/>
+            <a:ext cx="2971800" cy="457200"/>
+          </a:xfrm>
+          <a:prstGeom prst="rect">
+            <a:avLst/>
+          </a:prstGeom>
+        </p:spPr>
+        <p:txBody>
+          <a:bodyPr vert="horz" lIns="91440" tIns="45720" rIns="91440" bIns="45720" rtlCol="0" anchor="b"/>
+          <a:lstStyle>
+            <a:lvl1pPr algn="r">
+              <a:defRPr sz="1200"/>
+            </a:lvl1pPr>
+          </a:lstStyle>
+          <a:p>
+            <a:fld id="{EB1C0389-875F-4016-8E78-F327E7BAA0DB}" type="slidenum">
+              <a:rPr lang="en-US" smtClean="0"/>
+              <a:t>‹#›</a:t>
+            </a:fld>
+            <a:endParaRPr lang="en-US"/>
+          </a:p>
+        </p:txBody>
+      </p:sp>
+    </p:spTree>
+    <p:extLst>
+      <p:ext uri="{BB962C8B-B14F-4D97-AF65-F5344CB8AC3E}">
+        <p14:creationId xmlns:p14="http://schemas.microsoft.com/office/powerpoint/2010/main" val="2817616406"/>
+      </p:ext>
+    </p:extLst>
+  </p:cSld>
+  <p:clrMap bg1="lt1" tx1="dk1" bg2="lt2" tx2="dk2" accent1="accent1" accent2="accent2" accent3="accent3" accent4="accent4" accent5="accent5" accent6="accent6" hlink="hlink" folHlink="folHlink"/>
+  <p:notesStyle>
+    <a:lvl1pPr marL="0" algn="l" defTabSz="914400" rtl="0" eaLnBrk="1" latinLnBrk="0" hangingPunct="1">
+      <a:defRPr sz="1200" kern="1200">
+        <a:solidFill>
+          <a:schemeClr val="tx1"/>
+        </a:solidFill>
+        <a:latin typeface="+mn-lt"/>
+        <a:ea typeface="+mn-ea"/>
+        <a:cs typeface="+mn-cs"/>
+      </a:defRPr>
+    </a:lvl1pPr>
+    <a:lvl2pPr marL="457200" algn="l" defTabSz="914400" rtl="0" eaLnBrk="1" latinLnBrk="0" hangingPunct="1">
+      <a:defRPr sz="1200" kern="1200">
+        <a:solidFill>
+          <a:schemeClr val="tx1"/>
+        </a:solidFill>
+        <a:latin typeface="+mn-lt"/>
+        <a:ea typeface="+mn-ea"/>
+        <a:cs typeface="+mn-cs"/>
+      </a:defRPr>
+    </a:lvl2pPr>
+    <a:lvl3pPr marL="914400" algn="l" defTabSz="914400" rtl="0" eaLnBrk="1" latinLnBrk="0" hangingPunct="1">
+      <a:defRPr sz="1200" kern="1200">
+        <a:solidFill>
+          <a:schemeClr val="tx1"/>
+        </a:solidFill>
+        <a:latin typeface="+mn-lt"/>
+        <a:ea typeface="+mn-ea"/>
+        <a:cs typeface="+mn-cs"/>
+      </a:defRPr>
+    </a:lvl3pPr>
+    <a:lvl4pPr marL="1371600" algn="l" defTabSz="914400" rtl="0" eaLnBrk="1" latinLnBrk="0" hangingPunct="1">
+      <a:defRPr sz="1200" kern="1200">
+        <a:solidFill>
+          <a:schemeClr val="tx1"/>
+        </a:solidFill>
+        <a:latin typeface="+mn-lt"/>
+        <a:ea typeface="+mn-ea"/>
+        <a:cs typeface="+mn-cs"/>
+      </a:defRPr>
+    </a:lvl4pPr>
+    <a:lvl5pPr marL="1828800" algn="l" defTabSz="914400" rtl="0" eaLnBrk="1" latinLnBrk="0" hangingPunct="1">
+      <a:defRPr sz="1200" kern="1200">
+        <a:solidFill>
+          <a:schemeClr val="tx1"/>
+        </a:solidFill>
+        <a:latin typeface="+mn-lt"/>
+        <a:ea typeface="+mn-ea"/>
+        <a:cs typeface="+mn-cs"/>
+      </a:defRPr>
+    </a:lvl5pPr>
+    <a:lvl6pPr marL="2286000" algn="l" defTabSz="914400" rtl="0" eaLnBrk="1" latinLnBrk="0" hangingPunct="1">
+      <a:defRPr sz="1200" kern="1200">
+        <a:solidFill>
+          <a:schemeClr val="tx1"/>
+        </a:solidFill>
+        <a:latin typeface="+mn-lt"/>
+        <a:ea typeface="+mn-ea"/>
+        <a:cs typeface="+mn-cs"/>
+      </a:defRPr>
+    </a:lvl6pPr>
+    <a:lvl7pPr marL="2743200" algn="l" defTabSz="914400" rtl="0" eaLnBrk="1" latinLnBrk="0" hangingPunct="1">
+      <a:defRPr sz="1200" kern="1200">
+        <a:solidFill>
+          <a:schemeClr val="tx1"/>
+        </a:solidFill>
+        <a:latin typeface="+mn-lt"/>
+        <a:ea typeface="+mn-ea"/>
+        <a:cs typeface="+mn-cs"/>
+      </a:defRPr>
+    </a:lvl7pPr>
+    <a:lvl8pPr marL="3200400" algn="l" defTabSz="914400" rtl="0" eaLnBrk="1" latinLnBrk="0" hangingPunct="1">
+      <a:defRPr sz="1200" kern="1200">
+        <a:solidFill>
+          <a:schemeClr val="tx1"/>
+        </a:solidFill>
+        <a:latin typeface="+mn-lt"/>
+        <a:ea typeface="+mn-ea"/>
+        <a:cs typeface="+mn-cs"/>
+      </a:defRPr>
+    </a:lvl8pPr>
+    <a:lvl9pPr marL="3657600" algn="l" defTabSz="914400" rtl="0" eaLnBrk="1" latinLnBrk="0" hangingPunct="1">
+      <a:defRPr sz="1200" kern="1200">
+        <a:solidFill>
+          <a:schemeClr val="tx1"/>
+        </a:solidFill>
+        <a:latin typeface="+mn-lt"/>
+        <a:ea typeface="+mn-ea"/>
+        <a:cs typeface="+mn-cs"/>
+      </a:defRPr>
+    </a:lvl9pPr>
+  </p:notesStyle>
+</p:notesMaster>
+</file>
+
+<file path=ppt/notesSlides/notesSlide1.xml><?xml version="1.0" encoding="utf-8"?>
+<p:notes xmlns:a="http://schemas.openxmlformats.org/drawingml/2006/main" xmlns:r="http://schemas.openxmlformats.org/officeDocument/2006/relationships" xmlns:p="http://schemas.openxmlformats.org/presentationml/2006/main">
+  <p:cSld>
+    <p:spTree>
+      <p:nvGrpSpPr>
+        <p:cNvPr id="1" name=""/>
+        <p:cNvGrpSpPr/>
+        <p:nvPr/>
+      </p:nvGrpSpPr>
+      <p:grpSpPr>
+        <a:xfrm>
+          <a:off x="0" y="0"/>
+          <a:ext cx="0" cy="0"/>
+          <a:chOff x="0" y="0"/>
+          <a:chExt cx="0" cy="0"/>
+        </a:xfrm>
+      </p:grpSpPr>
+      <p:sp>
+        <p:nvSpPr>
+          <p:cNvPr id="2" name="Slide Image Placeholder 1"/>
+          <p:cNvSpPr>
+            <a:spLocks noGrp="1" noRot="1" noChangeAspect="1"/>
+          </p:cNvSpPr>
+          <p:nvPr>
+            <p:ph type="sldImg"/>
+          </p:nvPr>
+        </p:nvSpPr>
+        <p:spPr/>
+      </p:sp>
+      <p:sp>
+        <p:nvSpPr>
+          <p:cNvPr id="3" name="Notes Placeholder 2"/>
+          <p:cNvSpPr>
+            <a:spLocks noGrp="1"/>
+          </p:cNvSpPr>
+          <p:nvPr>
+            <p:ph type="body" idx="1"/>
+          </p:nvPr>
+        </p:nvSpPr>
+        <p:spPr/>
+        <p:txBody>
+          <a:bodyPr/>
+          <a:lstStyle/>
+          <a:p>
+            <a:endParaRPr lang="en-US" dirty="0"/>
+          </a:p>
+        </p:txBody>
+      </p:sp>
+      <p:sp>
+        <p:nvSpPr>
+          <p:cNvPr id="4" name="Slide Number Placeholder 3"/>
+          <p:cNvSpPr>
+            <a:spLocks noGrp="1"/>
+          </p:cNvSpPr>
+          <p:nvPr>
+            <p:ph type="sldNum" sz="quarter" idx="10"/>
+          </p:nvPr>
+        </p:nvSpPr>
+        <p:spPr/>
+        <p:txBody>
+          <a:bodyPr/>
+          <a:lstStyle/>
+          <a:p>
+            <a:fld id="{EB1C0389-875F-4016-8E78-F327E7BAA0DB}" type="slidenum">
+              <a:rPr lang="en-US" smtClean="0"/>
+              <a:t>1</a:t>
+            </a:fld>
+            <a:endParaRPr lang="en-US"/>
+          </a:p>
+        </p:txBody>
+      </p:sp>
+    </p:spTree>
+    <p:extLst>
+      <p:ext uri="{BB962C8B-B14F-4D97-AF65-F5344CB8AC3E}">
+        <p14:creationId xmlns:p14="http://schemas.microsoft.com/office/powerpoint/2010/main" val="2824729327"/>
+      </p:ext>
+    </p:extLst>
+  </p:cSld>
+  <p:clrMapOvr>
+    <a:masterClrMapping/>
+  </p:clrMapOvr>
+</p:notes>
 </file>
 
 <file path=ppt/slideLayouts/slideLayout1.xml><?xml version="1.0" encoding="utf-8"?>
@@ -3104,47 +3541,6 @@
           <p:nvPr/>
         </p:nvPicPr>
         <p:blipFill>
-          <a:blip r:embed="rId2">
-            <a:extLst>
-              <a:ext uri="{28A0092B-C50C-407E-A947-70E740481C1C}">
-                <a14:useLocalDpi xmlns:a14="http://schemas.microsoft.com/office/drawing/2010/main" val="0"/>
-              </a:ext>
-            </a:extLst>
-          </a:blip>
-          <a:srcRect/>
-          <a:stretch>
-            <a:fillRect/>
-          </a:stretch>
-        </p:blipFill>
-        <p:spPr bwMode="auto">
-          <a:xfrm>
-            <a:off x="4166434" y="146629"/>
-            <a:ext cx="634166" cy="854362"/>
-          </a:xfrm>
-          <a:prstGeom prst="rect">
-            <a:avLst/>
-          </a:prstGeom>
-          <a:noFill/>
-          <a:extLst>
-            <a:ext uri="{909E8E84-426E-40DD-AFC4-6F175D3DCCD1}">
-              <a14:hiddenFill xmlns:a14="http://schemas.microsoft.com/office/drawing/2010/main">
-                <a:solidFill>
-                  <a:srgbClr val="FFFFFF"/>
-                </a:solidFill>
-              </a14:hiddenFill>
-            </a:ext>
-          </a:extLst>
-        </p:spPr>
-      </p:pic>
-      <p:pic>
-        <p:nvPicPr>
-          <p:cNvPr id="57" name="Picture 51" descr="C:\Users\Han Htet\Documents\GitHub\HueHueBakersDozenSolitaire\HueHueBakersDozenSolitaire\HueHueBakersDozenSolitaireContent\HeartsThree.bmp"/>
-          <p:cNvPicPr>
-            <a:picLocks noChangeAspect="1" noChangeArrowheads="1"/>
-          </p:cNvPicPr>
-          <p:nvPr/>
-        </p:nvPicPr>
-        <p:blipFill>
           <a:blip r:embed="rId3">
             <a:extLst>
               <a:ext uri="{28A0092B-C50C-407E-A947-70E740481C1C}">
@@ -3159,7 +3555,7 @@
         </p:blipFill>
         <p:spPr bwMode="auto">
           <a:xfrm>
-            <a:off x="2159737" y="146629"/>
+            <a:off x="4166434" y="146629"/>
             <a:ext cx="634166" cy="854362"/>
           </a:xfrm>
           <a:prstGeom prst="rect">
@@ -3179,7 +3575,7 @@
       </p:pic>
       <p:pic>
         <p:nvPicPr>
-          <p:cNvPr id="58" name="Picture 53" descr="C:\Users\Han Htet\Documents\GitHub\HueHueBakersDozenSolitaire\HueHueBakersDozenSolitaire\HueHueBakersDozenSolitaireContent\SpadesAce.bmp"/>
+          <p:cNvPr id="57" name="Picture 51" descr="C:\Users\Han Htet\Documents\GitHub\HueHueBakersDozenSolitaire\HueHueBakersDozenSolitaire\HueHueBakersDozenSolitaireContent\HeartsThree.bmp"/>
           <p:cNvPicPr>
             <a:picLocks noChangeAspect="1" noChangeArrowheads="1"/>
           </p:cNvPicPr>
@@ -3200,7 +3596,7 @@
         </p:blipFill>
         <p:spPr bwMode="auto">
           <a:xfrm>
-            <a:off x="124691" y="146629"/>
+            <a:off x="2159737" y="146629"/>
             <a:ext cx="634166" cy="854362"/>
           </a:xfrm>
           <a:prstGeom prst="rect">
@@ -3220,7 +3616,7 @@
       </p:pic>
       <p:pic>
         <p:nvPicPr>
-          <p:cNvPr id="59" name="Picture 2" descr="C:\Users\Han Htet\Documents\GitHub\HueHueBakersDozenSolitaire\HueHueBakersDozenSolitaire\HueHueBakersDozenSolitaireContent\SpadesEight.bmp"/>
+          <p:cNvPr id="58" name="Picture 53" descr="C:\Users\Han Htet\Documents\GitHub\HueHueBakersDozenSolitaire\HueHueBakersDozenSolitaire\HueHueBakersDozenSolitaireContent\SpadesAce.bmp"/>
           <p:cNvPicPr>
             <a:picLocks noChangeAspect="1" noChangeArrowheads="1"/>
           </p:cNvPicPr>
@@ -3241,7 +3637,7 @@
         </p:blipFill>
         <p:spPr bwMode="auto">
           <a:xfrm>
-            <a:off x="2166664" y="462397"/>
+            <a:off x="124691" y="146629"/>
             <a:ext cx="634166" cy="854362"/>
           </a:xfrm>
           <a:prstGeom prst="rect">
@@ -3261,7 +3657,7 @@
       </p:pic>
       <p:pic>
         <p:nvPicPr>
-          <p:cNvPr id="60" name="Picture 4" descr="C:\Users\Han Htet\Documents\GitHub\HueHueBakersDozenSolitaire\HueHueBakersDozenSolitaire\HueHueBakersDozenSolitaireContent\SpadesFour.bmp"/>
+          <p:cNvPr id="59" name="Picture 2" descr="C:\Users\Han Htet\Documents\GitHub\HueHueBakersDozenSolitaire\HueHueBakersDozenSolitaire\HueHueBakersDozenSolitaireContent\SpadesEight.bmp"/>
           <p:cNvPicPr>
             <a:picLocks noChangeAspect="1" noChangeArrowheads="1"/>
           </p:cNvPicPr>
@@ -3282,7 +3678,7 @@
         </p:blipFill>
         <p:spPr bwMode="auto">
           <a:xfrm>
-            <a:off x="5517894" y="2969491"/>
+            <a:off x="2166664" y="462397"/>
             <a:ext cx="634166" cy="854362"/>
           </a:xfrm>
           <a:prstGeom prst="rect">
@@ -3302,7 +3698,7 @@
       </p:pic>
       <p:pic>
         <p:nvPicPr>
-          <p:cNvPr id="61" name="Picture 6" descr="C:\Users\Han Htet\Documents\GitHub\HueHueBakersDozenSolitaire\HueHueBakersDozenSolitaire\HueHueBakersDozenSolitaireContent\SpadesKing.bmp"/>
+          <p:cNvPr id="60" name="Picture 4" descr="C:\Users\Han Htet\Documents\GitHub\HueHueBakersDozenSolitaire\HueHueBakersDozenSolitaire\HueHueBakersDozenSolitaireContent\SpadesFour.bmp"/>
           <p:cNvPicPr>
             <a:picLocks noChangeAspect="1" noChangeArrowheads="1"/>
           </p:cNvPicPr>
@@ -3323,7 +3719,7 @@
         </p:blipFill>
         <p:spPr bwMode="auto">
           <a:xfrm>
-            <a:off x="124691" y="2976417"/>
+            <a:off x="5517894" y="2969491"/>
             <a:ext cx="634166" cy="854362"/>
           </a:xfrm>
           <a:prstGeom prst="rect">
@@ -3343,7 +3739,7 @@
       </p:pic>
       <p:pic>
         <p:nvPicPr>
-          <p:cNvPr id="62" name="Picture 9" descr="C:\Users\Han Htet\Documents\GitHub\HueHueBakersDozenSolitaire\HueHueBakersDozenSolitaire\HueHueBakersDozenSolitaireContent\SpadesSeven.bmp"/>
+          <p:cNvPr id="61" name="Picture 6" descr="C:\Users\Han Htet\Documents\GitHub\HueHueBakersDozenSolitaire\HueHueBakersDozenSolitaire\HueHueBakersDozenSolitaireContent\SpadesKing.bmp"/>
           <p:cNvPicPr>
             <a:picLocks noChangeAspect="1" noChangeArrowheads="1"/>
           </p:cNvPicPr>
@@ -3364,7 +3760,7 @@
         </p:blipFill>
         <p:spPr bwMode="auto">
           <a:xfrm>
-            <a:off x="4483517" y="2976417"/>
+            <a:off x="124691" y="2976417"/>
             <a:ext cx="634166" cy="854362"/>
           </a:xfrm>
           <a:prstGeom prst="rect">
@@ -3384,7 +3780,7 @@
       </p:pic>
       <p:pic>
         <p:nvPicPr>
-          <p:cNvPr id="63" name="Picture 14" descr="C:\Users\Han Htet\Documents\GitHub\HueHueBakersDozenSolitaire\HueHueBakersDozenSolitaire\HueHueBakersDozenSolitaireContent\ClubsAce.bmp"/>
+          <p:cNvPr id="62" name="Picture 9" descr="C:\Users\Han Htet\Documents\GitHub\HueHueBakersDozenSolitaire\HueHueBakersDozenSolitaire\HueHueBakersDozenSolitaireContent\SpadesSeven.bmp"/>
           <p:cNvPicPr>
             <a:picLocks noChangeAspect="1" noChangeArrowheads="1"/>
           </p:cNvPicPr>
@@ -3405,7 +3801,7 @@
         </p:blipFill>
         <p:spPr bwMode="auto">
           <a:xfrm>
-            <a:off x="2170128" y="739489"/>
+            <a:off x="4483517" y="2976417"/>
             <a:ext cx="634166" cy="854362"/>
           </a:xfrm>
           <a:prstGeom prst="rect">
@@ -3425,7 +3821,7 @@
       </p:pic>
       <p:pic>
         <p:nvPicPr>
-          <p:cNvPr id="64" name="Picture 17" descr="C:\Users\Han Htet\Documents\GitHub\HueHueBakersDozenSolitaire\HueHueBakersDozenSolitaire\HueHueBakersDozenSolitaireContent\ClubsFour.bmp"/>
+          <p:cNvPr id="63" name="Picture 14" descr="C:\Users\Han Htet\Documents\GitHub\HueHueBakersDozenSolitaire\HueHueBakersDozenSolitaire\HueHueBakersDozenSolitaireContent\ClubsAce.bmp"/>
           <p:cNvPicPr>
             <a:picLocks noChangeAspect="1" noChangeArrowheads="1"/>
           </p:cNvPicPr>
@@ -3446,7 +3842,7 @@
         </p:blipFill>
         <p:spPr bwMode="auto">
           <a:xfrm>
-            <a:off x="1136073" y="565730"/>
+            <a:off x="2170128" y="739489"/>
             <a:ext cx="634166" cy="854362"/>
           </a:xfrm>
           <a:prstGeom prst="rect">
@@ -3466,7 +3862,7 @@
       </p:pic>
       <p:pic>
         <p:nvPicPr>
-          <p:cNvPr id="65" name="Picture 18" descr="C:\Users\Han Htet\Documents\GitHub\HueHueBakersDozenSolitaire\HueHueBakersDozenSolitaire\HueHueBakersDozenSolitaireContent\ClubsJack.bmp"/>
+          <p:cNvPr id="64" name="Picture 17" descr="C:\Users\Han Htet\Documents\GitHub\HueHueBakersDozenSolitaire\HueHueBakersDozenSolitaire\HueHueBakersDozenSolitaireContent\ClubsFour.bmp"/>
           <p:cNvPicPr>
             <a:picLocks noChangeAspect="1" noChangeArrowheads="1"/>
           </p:cNvPicPr>
@@ -3487,7 +3883,7 @@
         </p:blipFill>
         <p:spPr bwMode="auto">
           <a:xfrm>
-            <a:off x="4166434" y="419680"/>
+            <a:off x="1136073" y="565730"/>
             <a:ext cx="634166" cy="854362"/>
           </a:xfrm>
           <a:prstGeom prst="rect">
@@ -3507,7 +3903,7 @@
       </p:pic>
       <p:pic>
         <p:nvPicPr>
-          <p:cNvPr id="66" name="Picture 19" descr="C:\Users\Han Htet\Documents\GitHub\HueHueBakersDozenSolitaire\HueHueBakersDozenSolitaire\HueHueBakersDozenSolitaireContent\ClubsKing.bmp"/>
+          <p:cNvPr id="65" name="Picture 18" descr="C:\Users\Han Htet\Documents\GitHub\HueHueBakersDozenSolitaire\HueHueBakersDozenSolitaire\HueHueBakersDozenSolitaireContent\ClubsJack.bmp"/>
           <p:cNvPicPr>
             <a:picLocks noChangeAspect="1" noChangeArrowheads="1"/>
           </p:cNvPicPr>
@@ -3528,7 +3924,7 @@
         </p:blipFill>
         <p:spPr bwMode="auto">
           <a:xfrm>
-            <a:off x="3200400" y="146629"/>
+            <a:off x="4166434" y="419680"/>
             <a:ext cx="634166" cy="854362"/>
           </a:xfrm>
           <a:prstGeom prst="rect">
@@ -3548,7 +3944,7 @@
       </p:pic>
       <p:pic>
         <p:nvPicPr>
-          <p:cNvPr id="67" name="Picture 25" descr="C:\Users\Han Htet\Documents\GitHub\HueHueBakersDozenSolitaire\HueHueBakersDozenSolitaire\HueHueBakersDozenSolitaireContent\ClubsThree.bmp"/>
+          <p:cNvPr id="66" name="Picture 19" descr="C:\Users\Han Htet\Documents\GitHub\HueHueBakersDozenSolitaire\HueHueBakersDozenSolitaire\HueHueBakersDozenSolitaireContent\ClubsKing.bmp"/>
           <p:cNvPicPr>
             <a:picLocks noChangeAspect="1" noChangeArrowheads="1"/>
           </p:cNvPicPr>
@@ -3569,7 +3965,7 @@
         </p:blipFill>
         <p:spPr bwMode="auto">
           <a:xfrm>
-            <a:off x="1143000" y="137394"/>
+            <a:off x="3200400" y="146629"/>
             <a:ext cx="634166" cy="854362"/>
           </a:xfrm>
           <a:prstGeom prst="rect">
@@ -3589,7 +3985,7 @@
       </p:pic>
       <p:pic>
         <p:nvPicPr>
-          <p:cNvPr id="68" name="Picture 28" descr="C:\Users\Han Htet\Documents\GitHub\HueHueBakersDozenSolitaire\HueHueBakersDozenSolitaire\HueHueBakersDozenSolitaireContent\DiamondsEight.bmp"/>
+          <p:cNvPr id="67" name="Picture 25" descr="C:\Users\Han Htet\Documents\GitHub\HueHueBakersDozenSolitaire\HueHueBakersDozenSolitaire\HueHueBakersDozenSolitaireContent\ClubsThree.bmp"/>
           <p:cNvPicPr>
             <a:picLocks noChangeAspect="1" noChangeArrowheads="1"/>
           </p:cNvPicPr>
@@ -3610,7 +4006,7 @@
         </p:blipFill>
         <p:spPr bwMode="auto">
           <a:xfrm>
-            <a:off x="2170128" y="2961412"/>
+            <a:off x="1143000" y="137394"/>
             <a:ext cx="634166" cy="854362"/>
           </a:xfrm>
           <a:prstGeom prst="rect">
@@ -3630,7 +4026,7 @@
       </p:pic>
       <p:pic>
         <p:nvPicPr>
-          <p:cNvPr id="69" name="Picture 34" descr="C:\Users\Han Htet\Documents\GitHub\HueHueBakersDozenSolitaire\HueHueBakersDozenSolitaire\HueHueBakersDozenSolitaireContent\DiamondsQueen.bmp"/>
+          <p:cNvPr id="68" name="Picture 28" descr="C:\Users\Han Htet\Documents\GitHub\HueHueBakersDozenSolitaire\HueHueBakersDozenSolitaire\HueHueBakersDozenSolitaireContent\DiamondsEight.bmp"/>
           <p:cNvPicPr>
             <a:picLocks noChangeAspect="1" noChangeArrowheads="1"/>
           </p:cNvPicPr>
@@ -3651,7 +4047,7 @@
         </p:blipFill>
         <p:spPr bwMode="auto">
           <a:xfrm>
-            <a:off x="3306201" y="2961412"/>
+            <a:off x="2170128" y="2961412"/>
             <a:ext cx="634166" cy="854362"/>
           </a:xfrm>
           <a:prstGeom prst="rect">
@@ -3671,7 +4067,7 @@
       </p:pic>
       <p:pic>
         <p:nvPicPr>
-          <p:cNvPr id="70" name="Picture 35" descr="C:\Users\Han Htet\Documents\GitHub\HueHueBakersDozenSolitaire\HueHueBakersDozenSolitaire\HueHueBakersDozenSolitaireContent\DiamondsSeven.bmp"/>
+          <p:cNvPr id="69" name="Picture 34" descr="C:\Users\Han Htet\Documents\GitHub\HueHueBakersDozenSolitaire\HueHueBakersDozenSolitaire\HueHueBakersDozenSolitaireContent\DiamondsQueen.bmp"/>
           <p:cNvPicPr>
             <a:picLocks noChangeAspect="1" noChangeArrowheads="1"/>
           </p:cNvPicPr>
@@ -3692,7 +4088,7 @@
         </p:blipFill>
         <p:spPr bwMode="auto">
           <a:xfrm>
-            <a:off x="4166434" y="739489"/>
+            <a:off x="3306201" y="2961412"/>
             <a:ext cx="634166" cy="854362"/>
           </a:xfrm>
           <a:prstGeom prst="rect">
@@ -3712,7 +4108,7 @@
       </p:pic>
       <p:pic>
         <p:nvPicPr>
-          <p:cNvPr id="71" name="Picture 38" descr="C:\Users\Han Htet\Documents\GitHub\HueHueBakersDozenSolitaire\HueHueBakersDozenSolitaire\HueHueBakersDozenSolitaireContent\DiamondsThree.bmp"/>
+          <p:cNvPr id="70" name="Picture 35" descr="C:\Users\Han Htet\Documents\GitHub\HueHueBakersDozenSolitaire\HueHueBakersDozenSolitaire\HueHueBakersDozenSolitaireContent\DiamondsSeven.bmp"/>
           <p:cNvPicPr>
             <a:picLocks noChangeAspect="1" noChangeArrowheads="1"/>
           </p:cNvPicPr>
@@ -3733,7 +4129,7 @@
         </p:blipFill>
         <p:spPr bwMode="auto">
           <a:xfrm>
-            <a:off x="124691" y="431222"/>
+            <a:off x="4166434" y="703118"/>
             <a:ext cx="634166" cy="854362"/>
           </a:xfrm>
           <a:prstGeom prst="rect">
@@ -3753,7 +4149,7 @@
       </p:pic>
       <p:pic>
         <p:nvPicPr>
-          <p:cNvPr id="72" name="Picture 37" descr="C:\Users\Han Htet\Documents\GitHub\HueHueBakersDozenSolitaire\HueHueBakersDozenSolitaire\HueHueBakersDozenSolitaireContent\DiamondsTen.bmp"/>
+          <p:cNvPr id="71" name="Picture 38" descr="C:\Users\Han Htet\Documents\GitHub\HueHueBakersDozenSolitaire\HueHueBakersDozenSolitaire\HueHueBakersDozenSolitaireContent\DiamondsThree.bmp"/>
           <p:cNvPicPr>
             <a:picLocks noChangeAspect="1" noChangeArrowheads="1"/>
           </p:cNvPicPr>
@@ -3774,7 +4170,7 @@
         </p:blipFill>
         <p:spPr bwMode="auto">
           <a:xfrm>
-            <a:off x="124691" y="731980"/>
+            <a:off x="124691" y="431222"/>
             <a:ext cx="634166" cy="854362"/>
           </a:xfrm>
           <a:prstGeom prst="rect">
@@ -3794,7 +4190,7 @@
       </p:pic>
       <p:pic>
         <p:nvPicPr>
-          <p:cNvPr id="73" name="Picture 41" descr="C:\Users\Han Htet\Documents\GitHub\HueHueBakersDozenSolitaire\HueHueBakersDozenSolitaire\HueHueBakersDozenSolitaireContent\HeartsEight.bmp"/>
+          <p:cNvPr id="72" name="Picture 37" descr="C:\Users\Han Htet\Documents\GitHub\HueHueBakersDozenSolitaire\HueHueBakersDozenSolitaire\HueHueBakersDozenSolitaireContent\DiamondsTen.bmp"/>
           <p:cNvPicPr>
             <a:picLocks noChangeAspect="1" noChangeArrowheads="1"/>
           </p:cNvPicPr>
@@ -3815,7 +4211,7 @@
         </p:blipFill>
         <p:spPr bwMode="auto">
           <a:xfrm>
-            <a:off x="1143000" y="2969491"/>
+            <a:off x="124691" y="731980"/>
             <a:ext cx="634166" cy="854362"/>
           </a:xfrm>
           <a:prstGeom prst="rect">
@@ -3835,7 +4231,7 @@
       </p:pic>
       <p:pic>
         <p:nvPicPr>
-          <p:cNvPr id="74" name="Picture 43" descr="C:\Users\Han Htet\Documents\GitHub\HueHueBakersDozenSolitaire\HueHueBakersDozenSolitaire\HueHueBakersDozenSolitaireContent\HeartsFour.bmp"/>
+          <p:cNvPr id="73" name="Picture 41" descr="C:\Users\Han Htet\Documents\GitHub\HueHueBakersDozenSolitaire\HueHueBakersDozenSolitaire\HueHueBakersDozenSolitaireContent\HeartsEight.bmp"/>
           <p:cNvPicPr>
             <a:picLocks noChangeAspect="1" noChangeArrowheads="1"/>
           </p:cNvPicPr>
@@ -3856,7 +4252,7 @@
         </p:blipFill>
         <p:spPr bwMode="auto">
           <a:xfrm>
-            <a:off x="4483517" y="3274290"/>
+            <a:off x="1143000" y="2969491"/>
             <a:ext cx="634166" cy="854362"/>
           </a:xfrm>
           <a:prstGeom prst="rect">
@@ -3876,7 +4272,7 @@
       </p:pic>
       <p:pic>
         <p:nvPicPr>
-          <p:cNvPr id="75" name="Picture 45" descr="C:\Users\Han Htet\Documents\GitHub\HueHueBakersDozenSolitaire\HueHueBakersDozenSolitaire\HueHueBakersDozenSolitaireContent\HeartsKing.bmp"/>
+          <p:cNvPr id="74" name="Picture 43" descr="C:\Users\Han Htet\Documents\GitHub\HueHueBakersDozenSolitaire\HueHueBakersDozenSolitaire\HueHueBakersDozenSolitaireContent\HeartsFour.bmp"/>
           <p:cNvPicPr>
             <a:picLocks noChangeAspect="1" noChangeArrowheads="1"/>
           </p:cNvPicPr>
@@ -3897,7 +4293,7 @@
         </p:blipFill>
         <p:spPr bwMode="auto">
           <a:xfrm>
-            <a:off x="6236117" y="146629"/>
+            <a:off x="4483517" y="3274290"/>
             <a:ext cx="634166" cy="854362"/>
           </a:xfrm>
           <a:prstGeom prst="rect">
@@ -3917,7 +4313,7 @@
       </p:pic>
       <p:pic>
         <p:nvPicPr>
-          <p:cNvPr id="76" name="Picture 48" descr="C:\Users\Han Htet\Documents\GitHub\HueHueBakersDozenSolitaire\HueHueBakersDozenSolitaire\HueHueBakersDozenSolitaireContent\HeartsSeven.bmp"/>
+          <p:cNvPr id="75" name="Picture 45" descr="C:\Users\Han Htet\Documents\GitHub\HueHueBakersDozenSolitaire\HueHueBakersDozenSolitaire\HueHueBakersDozenSolitaireContent\HeartsKing.bmp"/>
           <p:cNvPicPr>
             <a:picLocks noChangeAspect="1" noChangeArrowheads="1"/>
           </p:cNvPicPr>
@@ -3938,7 +4334,7 @@
         </p:blipFill>
         <p:spPr bwMode="auto">
           <a:xfrm>
-            <a:off x="5148856" y="154143"/>
+            <a:off x="6236117" y="146629"/>
             <a:ext cx="634166" cy="854362"/>
           </a:xfrm>
           <a:prstGeom prst="rect">
@@ -3958,7 +4354,7 @@
       </p:pic>
       <p:pic>
         <p:nvPicPr>
-          <p:cNvPr id="77" name="Picture 46" descr="C:\Users\Han Htet\Documents\GitHub\HueHueBakersDozenSolitaire\HueHueBakersDozenSolitaire\HueHueBakersDozenSolitaireContent\HeartsNine.bmp"/>
+          <p:cNvPr id="76" name="Picture 48" descr="C:\Users\Han Htet\Documents\GitHub\HueHueBakersDozenSolitaire\HueHueBakersDozenSolitaire\HueHueBakersDozenSolitaireContent\HeartsSeven.bmp"/>
           <p:cNvPicPr>
             <a:picLocks noChangeAspect="1" noChangeArrowheads="1"/>
           </p:cNvPicPr>
@@ -3979,7 +4375,7 @@
         </p:blipFill>
         <p:spPr bwMode="auto">
           <a:xfrm>
-            <a:off x="124691" y="3301998"/>
+            <a:off x="5148856" y="154143"/>
             <a:ext cx="634166" cy="854362"/>
           </a:xfrm>
           <a:prstGeom prst="rect">
@@ -3999,7 +4395,7 @@
       </p:pic>
       <p:pic>
         <p:nvPicPr>
-          <p:cNvPr id="78" name="Picture 49" descr="C:\Users\Han Htet\Documents\GitHub\HueHueBakersDozenSolitaire\HueHueBakersDozenSolitaire\HueHueBakersDozenSolitaireContent\HeartsSix.bmp"/>
+          <p:cNvPr id="77" name="Picture 46" descr="C:\Users\Han Htet\Documents\GitHub\HueHueBakersDozenSolitaire\HueHueBakersDozenSolitaire\HueHueBakersDozenSolitaireContent\HeartsNine.bmp"/>
           <p:cNvPicPr>
             <a:picLocks noChangeAspect="1" noChangeArrowheads="1"/>
           </p:cNvPicPr>
@@ -4020,7 +4416,7 @@
         </p:blipFill>
         <p:spPr bwMode="auto">
           <a:xfrm>
-            <a:off x="3200400" y="494144"/>
+            <a:off x="124691" y="3301998"/>
             <a:ext cx="634166" cy="854362"/>
           </a:xfrm>
           <a:prstGeom prst="rect">
@@ -4040,7 +4436,7 @@
       </p:pic>
       <p:pic>
         <p:nvPicPr>
-          <p:cNvPr id="79" name="Picture 50" descr="C:\Users\Han Htet\Documents\GitHub\HueHueBakersDozenSolitaire\HueHueBakersDozenSolitaire\HueHueBakersDozenSolitaireContent\HeartsTen.bmp"/>
+          <p:cNvPr id="78" name="Picture 49" descr="C:\Users\Han Htet\Documents\GitHub\HueHueBakersDozenSolitaire\HueHueBakersDozenSolitaire\HueHueBakersDozenSolitaireContent\HeartsSix.bmp"/>
           <p:cNvPicPr>
             <a:picLocks noChangeAspect="1" noChangeArrowheads="1"/>
           </p:cNvPicPr>
@@ -4061,7 +4457,7 @@
         </p:blipFill>
         <p:spPr bwMode="auto">
           <a:xfrm>
-            <a:off x="3200400" y="822616"/>
+            <a:off x="3200400" y="438152"/>
             <a:ext cx="634166" cy="854362"/>
           </a:xfrm>
           <a:prstGeom prst="rect">
@@ -4081,7 +4477,7 @@
       </p:pic>
       <p:pic>
         <p:nvPicPr>
-          <p:cNvPr id="80" name="Picture 52" descr="C:\Users\Han Htet\Documents\GitHub\HueHueBakersDozenSolitaire\HueHueBakersDozenSolitaire\HueHueBakersDozenSolitaireContent\HeartsTwo.bmp"/>
+          <p:cNvPr id="79" name="Picture 50" descr="C:\Users\Han Htet\Documents\GitHub\HueHueBakersDozenSolitaire\HueHueBakersDozenSolitaire\HueHueBakersDozenSolitaireContent\HeartsTen.bmp"/>
           <p:cNvPicPr>
             <a:picLocks noChangeAspect="1" noChangeArrowheads="1"/>
           </p:cNvPicPr>
@@ -4102,7 +4498,7 @@
         </p:blipFill>
         <p:spPr bwMode="auto">
           <a:xfrm>
-            <a:off x="1136073" y="438152"/>
+            <a:off x="3200400" y="696767"/>
             <a:ext cx="634166" cy="854362"/>
           </a:xfrm>
           <a:prstGeom prst="rect">
@@ -4122,7 +4518,7 @@
       </p:pic>
       <p:pic>
         <p:nvPicPr>
-          <p:cNvPr id="81" name="Picture 36" descr="C:\Users\Han Htet\Documents\GitHub\HueHueBakersDozenSolitaire\HueHueBakersDozenSolitaire\HueHueBakersDozenSolitaireContent\DiamondsSix.bmp"/>
+          <p:cNvPr id="80" name="Picture 52" descr="C:\Users\Han Htet\Documents\GitHub\HueHueBakersDozenSolitaire\HueHueBakersDozenSolitaire\HueHueBakersDozenSolitaireContent\HeartsTwo.bmp"/>
           <p:cNvPicPr>
             <a:picLocks noChangeAspect="1" noChangeArrowheads="1"/>
           </p:cNvPicPr>
@@ -4143,7 +4539,7 @@
         </p:blipFill>
         <p:spPr bwMode="auto">
           <a:xfrm>
-            <a:off x="124691" y="1000991"/>
+            <a:off x="1136073" y="438152"/>
             <a:ext cx="634166" cy="854362"/>
           </a:xfrm>
           <a:prstGeom prst="rect">
@@ -4163,7 +4559,7 @@
       </p:pic>
       <p:pic>
         <p:nvPicPr>
-          <p:cNvPr id="82" name="Picture 23" descr="C:\Users\Han Htet\Documents\GitHub\HueHueBakersDozenSolitaire\HueHueBakersDozenSolitaire\HueHueBakersDozenSolitaireContent\ClubsSix.bmp"/>
+          <p:cNvPr id="81" name="Picture 36" descr="C:\Users\Han Htet\Documents\GitHub\HueHueBakersDozenSolitaire\HueHueBakersDozenSolitaire\HueHueBakersDozenSolitaireContent\DiamondsSix.bmp"/>
           <p:cNvPicPr>
             <a:picLocks noChangeAspect="1" noChangeArrowheads="1"/>
           </p:cNvPicPr>
@@ -4184,7 +4580,7 @@
         </p:blipFill>
         <p:spPr bwMode="auto">
           <a:xfrm>
-            <a:off x="2176735" y="1000991"/>
+            <a:off x="124691" y="1000991"/>
             <a:ext cx="634166" cy="854362"/>
           </a:xfrm>
           <a:prstGeom prst="rect">
@@ -4204,7 +4600,7 @@
       </p:pic>
       <p:pic>
         <p:nvPicPr>
-          <p:cNvPr id="83" name="Picture 33" descr="C:\Users\Han Htet\Documents\GitHub\HueHueBakersDozenSolitaire\HueHueBakersDozenSolitaire\HueHueBakersDozenSolitaireContent\DiamondsNine.bmp"/>
+          <p:cNvPr id="82" name="Picture 23" descr="C:\Users\Han Htet\Documents\GitHub\HueHueBakersDozenSolitaire\HueHueBakersDozenSolitaire\HueHueBakersDozenSolitaireContent\ClubsSix.bmp"/>
           <p:cNvPicPr>
             <a:picLocks noChangeAspect="1" noChangeArrowheads="1"/>
           </p:cNvPicPr>
@@ -4225,7 +4621,7 @@
         </p:blipFill>
         <p:spPr bwMode="auto">
           <a:xfrm>
-            <a:off x="3200400" y="1000991"/>
+            <a:off x="2176735" y="1000991"/>
             <a:ext cx="634166" cy="854362"/>
           </a:xfrm>
           <a:prstGeom prst="rect">
@@ -4245,7 +4641,7 @@
       </p:pic>
       <p:pic>
         <p:nvPicPr>
-          <p:cNvPr id="84" name="Picture 24" descr="C:\Users\Han Htet\Documents\GitHub\HueHueBakersDozenSolitaire\HueHueBakersDozenSolitaire\HueHueBakersDozenSolitaireContent\ClubsTen.bmp"/>
+          <p:cNvPr id="83" name="Picture 33" descr="C:\Users\Han Htet\Documents\GitHub\HueHueBakersDozenSolitaire\HueHueBakersDozenSolitaire\HueHueBakersDozenSolitaireContent\DiamondsNine.bmp"/>
           <p:cNvPicPr>
             <a:picLocks noChangeAspect="1" noChangeArrowheads="1"/>
           </p:cNvPicPr>
@@ -4266,7 +4662,7 @@
         </p:blipFill>
         <p:spPr bwMode="auto">
           <a:xfrm>
-            <a:off x="1136073" y="748725"/>
+            <a:off x="3200400" y="1000991"/>
             <a:ext cx="634166" cy="854362"/>
           </a:xfrm>
           <a:prstGeom prst="rect">
@@ -4286,7 +4682,7 @@
       </p:pic>
       <p:pic>
         <p:nvPicPr>
-          <p:cNvPr id="85" name="Picture 16" descr="C:\Users\Han Htet\Documents\GitHub\HueHueBakersDozenSolitaire\HueHueBakersDozenSolitaire\HueHueBakersDozenSolitaireContent\ClubsFive.bmp"/>
+          <p:cNvPr id="84" name="Picture 24" descr="C:\Users\Han Htet\Documents\GitHub\HueHueBakersDozenSolitaire\HueHueBakersDozenSolitaire\HueHueBakersDozenSolitaireContent\ClubsTen.bmp"/>
           <p:cNvPicPr>
             <a:picLocks noChangeAspect="1" noChangeArrowheads="1"/>
           </p:cNvPicPr>
@@ -4307,7 +4703,7 @@
         </p:blipFill>
         <p:spPr bwMode="auto">
           <a:xfrm>
-            <a:off x="1122218" y="1008505"/>
+            <a:off x="1136073" y="748725"/>
             <a:ext cx="634166" cy="854362"/>
           </a:xfrm>
           <a:prstGeom prst="rect">
@@ -4327,7 +4723,7 @@
       </p:pic>
       <p:pic>
         <p:nvPicPr>
-          <p:cNvPr id="86" name="Picture 31" descr="C:\Users\Han Htet\Documents\GitHub\HueHueBakersDozenSolitaire\HueHueBakersDozenSolitaire\HueHueBakersDozenSolitaireContent\DiamondsJack.bmp"/>
+          <p:cNvPr id="85" name="Picture 16" descr="C:\Users\Han Htet\Documents\GitHub\HueHueBakersDozenSolitaire\HueHueBakersDozenSolitaire\HueHueBakersDozenSolitaireContent\ClubsFive.bmp"/>
           <p:cNvPicPr>
             <a:picLocks noChangeAspect="1" noChangeArrowheads="1"/>
           </p:cNvPicPr>
@@ -4348,7 +4744,7 @@
         </p:blipFill>
         <p:spPr bwMode="auto">
           <a:xfrm>
-            <a:off x="5176566" y="376970"/>
+            <a:off x="1122218" y="1008505"/>
             <a:ext cx="634166" cy="854362"/>
           </a:xfrm>
           <a:prstGeom prst="rect">
@@ -4368,7 +4764,7 @@
       </p:pic>
       <p:pic>
         <p:nvPicPr>
-          <p:cNvPr id="87" name="Picture 40" descr="C:\Users\Han Htet\Documents\GitHub\HueHueBakersDozenSolitaire\HueHueBakersDozenSolitaire\HueHueBakersDozenSolitaireContent\HeartsAce.bmp"/>
+          <p:cNvPr id="86" name="Picture 31" descr="C:\Users\Han Htet\Documents\GitHub\HueHueBakersDozenSolitaire\HueHueBakersDozenSolitaire\HueHueBakersDozenSolitaireContent\DiamondsJack.bmp"/>
           <p:cNvPicPr>
             <a:picLocks noChangeAspect="1" noChangeArrowheads="1"/>
           </p:cNvPicPr>
@@ -4389,7 +4785,7 @@
         </p:blipFill>
         <p:spPr bwMode="auto">
           <a:xfrm>
-            <a:off x="5176566" y="731980"/>
+            <a:off x="5148856" y="453740"/>
             <a:ext cx="634166" cy="854362"/>
           </a:xfrm>
           <a:prstGeom prst="rect">
@@ -4409,7 +4805,7 @@
       </p:pic>
       <p:pic>
         <p:nvPicPr>
-          <p:cNvPr id="88" name="Picture 13" descr="C:\Users\Han Htet\Documents\GitHub\HueHueBakersDozenSolitaire\HueHueBakersDozenSolitaire\HueHueBakersDozenSolitaireContent\SpadesTwo.bmp"/>
+          <p:cNvPr id="87" name="Picture 40" descr="C:\Users\Han Htet\Documents\GitHub\HueHueBakersDozenSolitaire\HueHueBakersDozenSolitaire\HueHueBakersDozenSolitaireContent\HeartsAce.bmp"/>
           <p:cNvPicPr>
             <a:picLocks noChangeAspect="1" noChangeArrowheads="1"/>
           </p:cNvPicPr>
@@ -4430,8 +4826,8 @@
         </p:blipFill>
         <p:spPr bwMode="auto">
           <a:xfrm>
-            <a:off x="5176566" y="1005395"/>
-            <a:ext cx="634166" cy="845554"/>
+            <a:off x="5176566" y="731980"/>
+            <a:ext cx="634166" cy="854362"/>
           </a:xfrm>
           <a:prstGeom prst="rect">
             <a:avLst/>
@@ -4450,7 +4846,7 @@
       </p:pic>
       <p:pic>
         <p:nvPicPr>
-          <p:cNvPr id="89" name="Picture 26" descr="C:\Users\Han Htet\Documents\GitHub\HueHueBakersDozenSolitaire\HueHueBakersDozenSolitaire\HueHueBakersDozenSolitaireContent\ClubsTwo.bmp"/>
+          <p:cNvPr id="88" name="Picture 13" descr="C:\Users\Han Htet\Documents\GitHub\HueHueBakersDozenSolitaire\HueHueBakersDozenSolitaire\HueHueBakersDozenSolitaireContent\SpadesTwo.bmp"/>
           <p:cNvPicPr>
             <a:picLocks noChangeAspect="1" noChangeArrowheads="1"/>
           </p:cNvPicPr>
@@ -4471,8 +4867,8 @@
         </p:blipFill>
         <p:spPr bwMode="auto">
           <a:xfrm>
-            <a:off x="4166434" y="1000991"/>
-            <a:ext cx="634166" cy="854362"/>
+            <a:off x="5176566" y="1005395"/>
+            <a:ext cx="634166" cy="845554"/>
           </a:xfrm>
           <a:prstGeom prst="rect">
             <a:avLst/>
@@ -4491,7 +4887,7 @@
       </p:pic>
       <p:pic>
         <p:nvPicPr>
-          <p:cNvPr id="90" name="Picture 12" descr="C:\Users\Han Htet\Documents\GitHub\HueHueBakersDozenSolitaire\HueHueBakersDozenSolitaire\HueHueBakersDozenSolitaireContent\SpadesThree.bmp"/>
+          <p:cNvPr id="89" name="Picture 26" descr="C:\Users\Han Htet\Documents\GitHub\HueHueBakersDozenSolitaire\HueHueBakersDozenSolitaire\HueHueBakersDozenSolitaireContent\ClubsTwo.bmp"/>
           <p:cNvPicPr>
             <a:picLocks noChangeAspect="1" noChangeArrowheads="1"/>
           </p:cNvPicPr>
@@ -4512,7 +4908,7 @@
         </p:blipFill>
         <p:spPr bwMode="auto">
           <a:xfrm>
-            <a:off x="6236117" y="465860"/>
+            <a:off x="4166434" y="1000991"/>
             <a:ext cx="634166" cy="854362"/>
           </a:xfrm>
           <a:prstGeom prst="rect">
@@ -4532,7 +4928,7 @@
       </p:pic>
       <p:pic>
         <p:nvPicPr>
-          <p:cNvPr id="91" name="Picture 11" descr="C:\Users\Han Htet\Documents\GitHub\HueHueBakersDozenSolitaire\HueHueBakersDozenSolitaire\HueHueBakersDozenSolitaireContent\SpadesTen.bmp"/>
+          <p:cNvPr id="90" name="Picture 12" descr="C:\Users\Han Htet\Documents\GitHub\HueHueBakersDozenSolitaire\HueHueBakersDozenSolitaire\HueHueBakersDozenSolitaireContent\SpadesThree.bmp"/>
           <p:cNvPicPr>
             <a:picLocks noChangeAspect="1" noChangeArrowheads="1"/>
           </p:cNvPicPr>
@@ -4553,7 +4949,7 @@
         </p:blipFill>
         <p:spPr bwMode="auto">
           <a:xfrm>
-            <a:off x="6236117" y="775279"/>
+            <a:off x="6210942" y="374086"/>
             <a:ext cx="634166" cy="854362"/>
           </a:xfrm>
           <a:prstGeom prst="rect">
@@ -4573,7 +4969,7 @@
       </p:pic>
       <p:pic>
         <p:nvPicPr>
-          <p:cNvPr id="92" name="Picture 27" descr="C:\Users\Han Htet\Documents\GitHub\HueHueBakersDozenSolitaire\HueHueBakersDozenSolitaire\HueHueBakersDozenSolitaireContent\DiamondsAce.bmp"/>
+          <p:cNvPr id="91" name="Picture 11" descr="C:\Users\Han Htet\Documents\GitHub\HueHueBakersDozenSolitaire\HueHueBakersDozenSolitaire\HueHueBakersDozenSolitaireContent\SpadesTen.bmp"/>
           <p:cNvPicPr>
             <a:picLocks noChangeAspect="1" noChangeArrowheads="1"/>
           </p:cNvPicPr>
@@ -4594,7 +4990,7 @@
         </p:blipFill>
         <p:spPr bwMode="auto">
           <a:xfrm>
-            <a:off x="6243043" y="1008505"/>
+            <a:off x="6244649" y="587675"/>
             <a:ext cx="634166" cy="854362"/>
           </a:xfrm>
           <a:prstGeom prst="rect">
@@ -4614,7 +5010,7 @@
       </p:pic>
       <p:pic>
         <p:nvPicPr>
-          <p:cNvPr id="93" name="Picture 22" descr="C:\Users\Han Htet\Documents\GitHub\HueHueBakersDozenSolitaire\HueHueBakersDozenSolitaire\HueHueBakersDozenSolitaireContent\ClubsSeven.bmp"/>
+          <p:cNvPr id="92" name="Picture 27" descr="C:\Users\Han Htet\Documents\GitHub\HueHueBakersDozenSolitaire\HueHueBakersDozenSolitaire\HueHueBakersDozenSolitaireContent\DiamondsAce.bmp"/>
           <p:cNvPicPr>
             <a:picLocks noChangeAspect="1" noChangeArrowheads="1"/>
           </p:cNvPicPr>
@@ -4635,7 +5031,7 @@
         </p:blipFill>
         <p:spPr bwMode="auto">
           <a:xfrm>
-            <a:off x="124691" y="3586017"/>
+            <a:off x="6236117" y="1007342"/>
             <a:ext cx="634166" cy="854362"/>
           </a:xfrm>
           <a:prstGeom prst="rect">
@@ -4655,7 +5051,7 @@
       </p:pic>
       <p:pic>
         <p:nvPicPr>
-          <p:cNvPr id="94" name="Picture 20" descr="C:\Users\Han Htet\Documents\GitHub\HueHueBakersDozenSolitaire\HueHueBakersDozenSolitaire\HueHueBakersDozenSolitaireContent\ClubsNine.bmp"/>
+          <p:cNvPr id="93" name="Picture 22" descr="C:\Users\Han Htet\Documents\GitHub\HueHueBakersDozenSolitaire\HueHueBakersDozenSolitaire\HueHueBakersDozenSolitaireContent\ClubsSeven.bmp"/>
           <p:cNvPicPr>
             <a:picLocks noChangeAspect="1" noChangeArrowheads="1"/>
           </p:cNvPicPr>
@@ -4676,7 +5072,7 @@
         </p:blipFill>
         <p:spPr bwMode="auto">
           <a:xfrm>
-            <a:off x="124691" y="3839439"/>
+            <a:off x="124691" y="3586017"/>
             <a:ext cx="634166" cy="854362"/>
           </a:xfrm>
           <a:prstGeom prst="rect">
@@ -4696,7 +5092,7 @@
       </p:pic>
       <p:pic>
         <p:nvPicPr>
-          <p:cNvPr id="95" name="Picture 15" descr="C:\Users\Han Htet\Documents\GitHub\HueHueBakersDozenSolitaire\HueHueBakersDozenSolitaire\HueHueBakersDozenSolitaireContent\ClubsEight.bmp"/>
+          <p:cNvPr id="94" name="Picture 20" descr="C:\Users\Han Htet\Documents\GitHub\HueHueBakersDozenSolitaire\HueHueBakersDozenSolitaire\HueHueBakersDozenSolitaireContent\ClubsNine.bmp"/>
           <p:cNvPicPr>
             <a:picLocks noChangeAspect="1" noChangeArrowheads="1"/>
           </p:cNvPicPr>
@@ -4717,7 +5113,7 @@
         </p:blipFill>
         <p:spPr bwMode="auto">
           <a:xfrm>
-            <a:off x="1143000" y="3314701"/>
+            <a:off x="124691" y="3839439"/>
             <a:ext cx="634166" cy="854362"/>
           </a:xfrm>
           <a:prstGeom prst="rect">
@@ -4737,7 +5133,7 @@
       </p:pic>
       <p:pic>
         <p:nvPicPr>
-          <p:cNvPr id="96" name="Picture 39" descr="C:\Users\Han Htet\Documents\GitHub\HueHueBakersDozenSolitaire\HueHueBakersDozenSolitaire\HueHueBakersDozenSolitaireContent\DiamondsTwo.bmp"/>
+          <p:cNvPr id="95" name="Picture 15" descr="C:\Users\Han Htet\Documents\GitHub\HueHueBakersDozenSolitaire\HueHueBakersDozenSolitaire\HueHueBakersDozenSolitaireContent\ClubsEight.bmp"/>
           <p:cNvPicPr>
             <a:picLocks noChangeAspect="1" noChangeArrowheads="1"/>
           </p:cNvPicPr>
@@ -4758,7 +5154,7 @@
         </p:blipFill>
         <p:spPr bwMode="auto">
           <a:xfrm>
-            <a:off x="1143000" y="3625849"/>
+            <a:off x="1143000" y="3314701"/>
             <a:ext cx="634166" cy="854362"/>
           </a:xfrm>
           <a:prstGeom prst="rect">
@@ -4778,7 +5174,7 @@
       </p:pic>
       <p:pic>
         <p:nvPicPr>
-          <p:cNvPr id="97" name="Picture 21" descr="C:\Users\Han Htet\Documents\GitHub\HueHueBakersDozenSolitaire\HueHueBakersDozenSolitaire\HueHueBakersDozenSolitaireContent\ClubsQueen.bmp"/>
+          <p:cNvPr id="96" name="Picture 39" descr="C:\Users\Han Htet\Documents\GitHub\HueHueBakersDozenSolitaire\HueHueBakersDozenSolitaire\HueHueBakersDozenSolitaireContent\DiamondsTwo.bmp"/>
           <p:cNvPicPr>
             <a:picLocks noChangeAspect="1" noChangeArrowheads="1"/>
           </p:cNvPicPr>
@@ -4799,7 +5195,7 @@
         </p:blipFill>
         <p:spPr bwMode="auto">
           <a:xfrm>
-            <a:off x="1143000" y="3823853"/>
+            <a:off x="1143000" y="3625849"/>
             <a:ext cx="634166" cy="854362"/>
           </a:xfrm>
           <a:prstGeom prst="rect">
@@ -4819,7 +5215,7 @@
       </p:pic>
       <p:pic>
         <p:nvPicPr>
-          <p:cNvPr id="98" name="Picture 10" descr="C:\Users\Han Htet\Documents\GitHub\HueHueBakersDozenSolitaire\HueHueBakersDozenSolitaire\HueHueBakersDozenSolitaireContent\SpadesSix.bmp"/>
+          <p:cNvPr id="97" name="Picture 21" descr="C:\Users\Han Htet\Documents\GitHub\HueHueBakersDozenSolitaire\HueHueBakersDozenSolitaire\HueHueBakersDozenSolitaireContent\ClubsQueen.bmp"/>
           <p:cNvPicPr>
             <a:picLocks noChangeAspect="1" noChangeArrowheads="1"/>
           </p:cNvPicPr>
@@ -4840,7 +5236,7 @@
         </p:blipFill>
         <p:spPr bwMode="auto">
           <a:xfrm>
-            <a:off x="2163201" y="3252355"/>
+            <a:off x="1143000" y="3823853"/>
             <a:ext cx="634166" cy="854362"/>
           </a:xfrm>
           <a:prstGeom prst="rect">
@@ -4860,7 +5256,7 @@
       </p:pic>
       <p:pic>
         <p:nvPicPr>
-          <p:cNvPr id="99" name="Picture 29" descr="C:\Users\Han Htet\Documents\GitHub\HueHueBakersDozenSolitaire\HueHueBakersDozenSolitaire\HueHueBakersDozenSolitaireContent\DiamondsFive.bmp"/>
+          <p:cNvPr id="98" name="Picture 10" descr="C:\Users\Han Htet\Documents\GitHub\HueHueBakersDozenSolitaire\HueHueBakersDozenSolitaire\HueHueBakersDozenSolitaireContent\SpadesSix.bmp"/>
           <p:cNvPicPr>
             <a:picLocks noChangeAspect="1" noChangeArrowheads="1"/>
           </p:cNvPicPr>
@@ -4881,7 +5277,7 @@
         </p:blipFill>
         <p:spPr bwMode="auto">
           <a:xfrm>
-            <a:off x="2163201" y="3576783"/>
+            <a:off x="2163201" y="3252355"/>
             <a:ext cx="634166" cy="854362"/>
           </a:xfrm>
           <a:prstGeom prst="rect">
@@ -4901,7 +5297,7 @@
       </p:pic>
       <p:pic>
         <p:nvPicPr>
-          <p:cNvPr id="100" name="Picture 44" descr="C:\Users\Han Htet\Documents\GitHub\HueHueBakersDozenSolitaire\HueHueBakersDozenSolitaire\HueHueBakersDozenSolitaireContent\HeartsJack.bmp"/>
+          <p:cNvPr id="99" name="Picture 29" descr="C:\Users\Han Htet\Documents\GitHub\HueHueBakersDozenSolitaire\HueHueBakersDozenSolitaire\HueHueBakersDozenSolitaireContent\DiamondsFive.bmp"/>
           <p:cNvPicPr>
             <a:picLocks noChangeAspect="1" noChangeArrowheads="1"/>
           </p:cNvPicPr>
@@ -4922,7 +5318,7 @@
         </p:blipFill>
         <p:spPr bwMode="auto">
           <a:xfrm>
-            <a:off x="2176735" y="3839439"/>
+            <a:off x="2163201" y="3576783"/>
             <a:ext cx="634166" cy="854362"/>
           </a:xfrm>
           <a:prstGeom prst="rect">
@@ -4942,7 +5338,7 @@
       </p:pic>
       <p:pic>
         <p:nvPicPr>
-          <p:cNvPr id="101" name="Picture 30" descr="C:\Users\Han Htet\Documents\GitHub\HueHueBakersDozenSolitaire\HueHueBakersDozenSolitaire\HueHueBakersDozenSolitaireContent\DiamondsFour.bmp"/>
+          <p:cNvPr id="100" name="Picture 44" descr="C:\Users\Han Htet\Documents\GitHub\HueHueBakersDozenSolitaire\HueHueBakersDozenSolitaire\HueHueBakersDozenSolitaireContent\HeartsJack.bmp"/>
           <p:cNvPicPr>
             <a:picLocks noChangeAspect="1" noChangeArrowheads="1"/>
           </p:cNvPicPr>
@@ -4963,7 +5359,7 @@
         </p:blipFill>
         <p:spPr bwMode="auto">
           <a:xfrm>
-            <a:off x="3313128" y="3327980"/>
+            <a:off x="2176735" y="3839439"/>
             <a:ext cx="634166" cy="854362"/>
           </a:xfrm>
           <a:prstGeom prst="rect">
@@ -4983,7 +5379,7 @@
       </p:pic>
       <p:pic>
         <p:nvPicPr>
-          <p:cNvPr id="102" name="Picture 7" descr="C:\Users\Han Htet\Documents\GitHub\HueHueBakersDozenSolitaire\HueHueBakersDozenSolitaire\HueHueBakersDozenSolitaireContent\SpadesNine.bmp"/>
+          <p:cNvPr id="101" name="Picture 30" descr="C:\Users\Han Htet\Documents\GitHub\HueHueBakersDozenSolitaire\HueHueBakersDozenSolitaire\HueHueBakersDozenSolitaireContent\DiamondsFour.bmp"/>
           <p:cNvPicPr>
             <a:picLocks noChangeAspect="1" noChangeArrowheads="1"/>
           </p:cNvPicPr>
@@ -5004,7 +5400,7 @@
         </p:blipFill>
         <p:spPr bwMode="auto">
           <a:xfrm>
-            <a:off x="3306201" y="3646058"/>
+            <a:off x="3313128" y="3327980"/>
             <a:ext cx="634166" cy="854362"/>
           </a:xfrm>
           <a:prstGeom prst="rect">
@@ -5024,7 +5420,7 @@
       </p:pic>
       <p:pic>
         <p:nvPicPr>
-          <p:cNvPr id="103" name="Picture 8" descr="C:\Users\Han Htet\Documents\GitHub\HueHueBakersDozenSolitaire\HueHueBakersDozenSolitaire\HueHueBakersDozenSolitaireContent\SpadesQueen.bmp"/>
+          <p:cNvPr id="102" name="Picture 7" descr="C:\Users\Han Htet\Documents\GitHub\HueHueBakersDozenSolitaire\HueHueBakersDozenSolitaire\HueHueBakersDozenSolitaireContent\SpadesNine.bmp"/>
           <p:cNvPicPr>
             <a:picLocks noChangeAspect="1" noChangeArrowheads="1"/>
           </p:cNvPicPr>
@@ -5045,7 +5441,7 @@
         </p:blipFill>
         <p:spPr bwMode="auto">
           <a:xfrm>
-            <a:off x="3304629" y="3947394"/>
+            <a:off x="3306201" y="3575627"/>
             <a:ext cx="634166" cy="854362"/>
           </a:xfrm>
           <a:prstGeom prst="rect">
@@ -5065,7 +5461,7 @@
       </p:pic>
       <p:pic>
         <p:nvPicPr>
-          <p:cNvPr id="104" name="Picture 42" descr="C:\Users\Han Htet\Documents\GitHub\HueHueBakersDozenSolitaire\HueHueBakersDozenSolitaire\HueHueBakersDozenSolitaireContent\HeartsFive.bmp"/>
+          <p:cNvPr id="103" name="Picture 8" descr="C:\Users\Han Htet\Documents\GitHub\HueHueBakersDozenSolitaire\HueHueBakersDozenSolitaire\HueHueBakersDozenSolitaireContent\SpadesQueen.bmp"/>
           <p:cNvPicPr>
             <a:picLocks noChangeAspect="1" noChangeArrowheads="1"/>
           </p:cNvPicPr>
@@ -5086,8 +5482,8 @@
         </p:blipFill>
         <p:spPr bwMode="auto">
           <a:xfrm>
-            <a:off x="4483517" y="3592366"/>
-            <a:ext cx="634166" cy="845554"/>
+            <a:off x="3313128" y="3833088"/>
+            <a:ext cx="634166" cy="854362"/>
           </a:xfrm>
           <a:prstGeom prst="rect">
             <a:avLst/>
@@ -5106,7 +5502,7 @@
       </p:pic>
       <p:pic>
         <p:nvPicPr>
-          <p:cNvPr id="105" name="Picture 5" descr="C:\Users\Han Htet\Documents\GitHub\HueHueBakersDozenSolitaire\HueHueBakersDozenSolitaire\HueHueBakersDozenSolitaireContent\SpadesJack.bmp"/>
+          <p:cNvPr id="104" name="Picture 42" descr="C:\Users\Han Htet\Documents\GitHub\HueHueBakersDozenSolitaire\HueHueBakersDozenSolitaire\HueHueBakersDozenSolitaireContent\HeartsFive.bmp"/>
           <p:cNvPicPr>
             <a:picLocks noChangeAspect="1" noChangeArrowheads="1"/>
           </p:cNvPicPr>
@@ -5127,8 +5523,8 @@
         </p:blipFill>
         <p:spPr bwMode="auto">
           <a:xfrm>
-            <a:off x="4483517" y="3883890"/>
-            <a:ext cx="634166" cy="854362"/>
+            <a:off x="4483517" y="3592366"/>
+            <a:ext cx="634166" cy="845554"/>
           </a:xfrm>
           <a:prstGeom prst="rect">
             <a:avLst/>
@@ -5147,7 +5543,7 @@
       </p:pic>
       <p:pic>
         <p:nvPicPr>
-          <p:cNvPr id="106" name="Picture 3" descr="C:\Users\Han Htet\Documents\GitHub\HueHueBakersDozenSolitaire\HueHueBakersDozenSolitaire\HueHueBakersDozenSolitaireContent\SpadesFive.bmp"/>
+          <p:cNvPr id="105" name="Picture 5" descr="C:\Users\Han Htet\Documents\GitHub\HueHueBakersDozenSolitaire\HueHueBakersDozenSolitaire\HueHueBakersDozenSolitaireContent\SpadesJack.bmp"/>
           <p:cNvPicPr>
             <a:picLocks noChangeAspect="1" noChangeArrowheads="1"/>
           </p:cNvPicPr>
@@ -5168,7 +5564,7 @@
         </p:blipFill>
         <p:spPr bwMode="auto">
           <a:xfrm>
-            <a:off x="5517894" y="3232728"/>
+            <a:off x="4483517" y="3849826"/>
             <a:ext cx="634166" cy="854362"/>
           </a:xfrm>
           <a:prstGeom prst="rect">
@@ -5188,7 +5584,7 @@
       </p:pic>
       <p:pic>
         <p:nvPicPr>
-          <p:cNvPr id="107" name="Picture 47" descr="C:\Users\Han Htet\Documents\GitHub\HueHueBakersDozenSolitaire\HueHueBakersDozenSolitaire\HueHueBakersDozenSolitaireContent\HeartsQueen.bmp"/>
+          <p:cNvPr id="106" name="Picture 3" descr="C:\Users\Han Htet\Documents\GitHub\HueHueBakersDozenSolitaire\HueHueBakersDozenSolitaire\HueHueBakersDozenSolitaireContent\SpadesFive.bmp"/>
           <p:cNvPicPr>
             <a:picLocks noChangeAspect="1" noChangeArrowheads="1"/>
           </p:cNvPicPr>
@@ -5209,8 +5605,90 @@
         </p:blipFill>
         <p:spPr bwMode="auto">
           <a:xfrm>
+            <a:off x="5517894" y="3232728"/>
+            <a:ext cx="634166" cy="854362"/>
+          </a:xfrm>
+          <a:prstGeom prst="rect">
+            <a:avLst/>
+          </a:prstGeom>
+          <a:noFill/>
+          <a:extLst>
+            <a:ext uri="{909E8E84-426E-40DD-AFC4-6F175D3DCCD1}">
+              <a14:hiddenFill xmlns:a14="http://schemas.microsoft.com/office/drawing/2010/main">
+                <a:solidFill>
+                  <a:srgbClr val="FFFFFF"/>
+                </a:solidFill>
+              </a14:hiddenFill>
+            </a:ext>
+          </a:extLst>
+        </p:spPr>
+      </p:pic>
+      <p:pic>
+        <p:nvPicPr>
+          <p:cNvPr id="107" name="Picture 47" descr="C:\Users\Han Htet\Documents\GitHub\HueHueBakersDozenSolitaire\HueHueBakersDozenSolitaire\HueHueBakersDozenSolitaireContent\HeartsQueen.bmp"/>
+          <p:cNvPicPr>
+            <a:picLocks noChangeAspect="1" noChangeArrowheads="1"/>
+          </p:cNvPicPr>
+          <p:nvPr/>
+        </p:nvPicPr>
+        <p:blipFill>
+          <a:blip r:embed="rId54">
+            <a:extLst>
+              <a:ext uri="{28A0092B-C50C-407E-A947-70E740481C1C}">
+                <a14:useLocalDpi xmlns:a14="http://schemas.microsoft.com/office/drawing/2010/main" val="0"/>
+              </a:ext>
+            </a:extLst>
+          </a:blip>
+          <a:srcRect/>
+          <a:stretch>
+            <a:fillRect/>
+          </a:stretch>
+        </p:blipFill>
+        <p:spPr bwMode="auto">
+          <a:xfrm>
             <a:off x="5517894" y="3585441"/>
             <a:ext cx="634166" cy="854362"/>
+          </a:xfrm>
+          <a:prstGeom prst="rect">
+            <a:avLst/>
+          </a:prstGeom>
+          <a:noFill/>
+          <a:extLst>
+            <a:ext uri="{909E8E84-426E-40DD-AFC4-6F175D3DCCD1}">
+              <a14:hiddenFill xmlns:a14="http://schemas.microsoft.com/office/drawing/2010/main">
+                <a:solidFill>
+                  <a:srgbClr val="FFFFFF"/>
+                </a:solidFill>
+              </a14:hiddenFill>
+            </a:ext>
+          </a:extLst>
+        </p:spPr>
+      </p:pic>
+      <p:pic>
+        <p:nvPicPr>
+          <p:cNvPr id="1026" name="Picture 2" descr="C:\Users\Han Htet\Documents\GitHub\HueHueBakersDozenSolitaire\HueHueBakersDozenSolitaire\HueHueBakersDozenSolitaireContent\ClubsFour.bmp"/>
+          <p:cNvPicPr>
+            <a:picLocks noChangeAspect="1" noChangeArrowheads="1"/>
+          </p:cNvPicPr>
+          <p:nvPr/>
+        </p:nvPicPr>
+        <p:blipFill>
+          <a:blip r:embed="rId11">
+            <a:extLst>
+              <a:ext uri="{28A0092B-C50C-407E-A947-70E740481C1C}">
+                <a14:useLocalDpi xmlns:a14="http://schemas.microsoft.com/office/drawing/2010/main" val="0"/>
+              </a:ext>
+            </a:extLst>
+          </a:blip>
+          <a:srcRect/>
+          <a:stretch>
+            <a:fillRect/>
+          </a:stretch>
+        </p:blipFill>
+        <p:spPr bwMode="auto">
+          <a:xfrm>
+            <a:off x="5518073" y="3839439"/>
+            <a:ext cx="692869" cy="933448"/>
           </a:xfrm>
           <a:prstGeom prst="rect">
             <a:avLst/>
@@ -5523,4 +6001,289 @@
   <a:objectDefaults/>
   <a:extraClrSchemeLst/>
 </a:theme>
+</file>
+
+<file path=ppt/theme/theme2.xml><?xml version="1.0" encoding="utf-8"?>
+<a:theme xmlns:a="http://schemas.openxmlformats.org/drawingml/2006/main" name="Office Theme">
+  <a:themeElements>
+    <a:clrScheme name="Office">
+      <a:dk1>
+        <a:sysClr val="windowText" lastClr="000000"/>
+      </a:dk1>
+      <a:lt1>
+        <a:sysClr val="window" lastClr="FFFFFF"/>
+      </a:lt1>
+      <a:dk2>
+        <a:srgbClr val="1F497D"/>
+      </a:dk2>
+      <a:lt2>
+        <a:srgbClr val="EEECE1"/>
+      </a:lt2>
+      <a:accent1>
+        <a:srgbClr val="4F81BD"/>
+      </a:accent1>
+      <a:accent2>
+        <a:srgbClr val="C0504D"/>
+      </a:accent2>
+      <a:accent3>
+        <a:srgbClr val="9BBB59"/>
+      </a:accent3>
+      <a:accent4>
+        <a:srgbClr val="8064A2"/>
+      </a:accent4>
+      <a:accent5>
+        <a:srgbClr val="4BACC6"/>
+      </a:accent5>
+      <a:accent6>
+        <a:srgbClr val="F79646"/>
+      </a:accent6>
+      <a:hlink>
+        <a:srgbClr val="0000FF"/>
+      </a:hlink>
+      <a:folHlink>
+        <a:srgbClr val="800080"/>
+      </a:folHlink>
+    </a:clrScheme>
+    <a:fontScheme name="Office">
+      <a:majorFont>
+        <a:latin typeface="Calibri"/>
+        <a:ea typeface=""/>
+        <a:cs typeface=""/>
+        <a:font script="Jpan" typeface="ＭＳ Ｐゴシック"/>
+        <a:font script="Hang" typeface="맑은 고딕"/>
+        <a:font script="Hans" typeface="宋体"/>
+        <a:font script="Hant" typeface="新細明體"/>
+        <a:font script="Arab" typeface="Times New Roman"/>
+        <a:font script="Hebr" typeface="Times New Roman"/>
+        <a:font script="Thai" typeface="Angsana New"/>
+        <a:font script="Ethi" typeface="Nyala"/>
+        <a:font script="Beng" typeface="Vrinda"/>
+        <a:font script="Gujr" typeface="Shruti"/>
+        <a:font script="Khmr" typeface="MoolBoran"/>
+        <a:font script="Knda" typeface="Tunga"/>
+        <a:font script="Guru" typeface="Raavi"/>
+        <a:font script="Cans" typeface="Euphemia"/>
+        <a:font script="Cher" typeface="Plantagenet Cherokee"/>
+        <a:font script="Yiii" typeface="Microsoft Yi Baiti"/>
+        <a:font script="Tibt" typeface="Microsoft Himalaya"/>
+        <a:font script="Thaa" typeface="MV Boli"/>
+        <a:font script="Deva" typeface="Mangal"/>
+        <a:font script="Telu" typeface="Gautami"/>
+        <a:font script="Taml" typeface="Latha"/>
+        <a:font script="Syrc" typeface="Estrangelo Edessa"/>
+        <a:font script="Orya" typeface="Kalinga"/>
+        <a:font script="Mlym" typeface="Kartika"/>
+        <a:font script="Laoo" typeface="DokChampa"/>
+        <a:font script="Sinh" typeface="Iskoola Pota"/>
+        <a:font script="Mong" typeface="Mongolian Baiti"/>
+        <a:font script="Viet" typeface="Times New Roman"/>
+        <a:font script="Uigh" typeface="Microsoft Uighur"/>
+        <a:font script="Geor" typeface="Sylfaen"/>
+      </a:majorFont>
+      <a:minorFont>
+        <a:latin typeface="Calibri"/>
+        <a:ea typeface=""/>
+        <a:cs typeface=""/>
+        <a:font script="Jpan" typeface="ＭＳ Ｐゴシック"/>
+        <a:font script="Hang" typeface="맑은 고딕"/>
+        <a:font script="Hans" typeface="宋体"/>
+        <a:font script="Hant" typeface="新細明體"/>
+        <a:font script="Arab" typeface="Arial"/>
+        <a:font script="Hebr" typeface="Arial"/>
+        <a:font script="Thai" typeface="Cordia New"/>
+        <a:font script="Ethi" typeface="Nyala"/>
+        <a:font script="Beng" typeface="Vrinda"/>
+        <a:font script="Gujr" typeface="Shruti"/>
+        <a:font script="Khmr" typeface="DaunPenh"/>
+        <a:font script="Knda" typeface="Tunga"/>
+        <a:font script="Guru" typeface="Raavi"/>
+        <a:font script="Cans" typeface="Euphemia"/>
+        <a:font script="Cher" typeface="Plantagenet Cherokee"/>
+        <a:font script="Yiii" typeface="Microsoft Yi Baiti"/>
+        <a:font script="Tibt" typeface="Microsoft Himalaya"/>
+        <a:font script="Thaa" typeface="MV Boli"/>
+        <a:font script="Deva" typeface="Mangal"/>
+        <a:font script="Telu" typeface="Gautami"/>
+        <a:font script="Taml" typeface="Latha"/>
+        <a:font script="Syrc" typeface="Estrangelo Edessa"/>
+        <a:font script="Orya" typeface="Kalinga"/>
+        <a:font script="Mlym" typeface="Kartika"/>
+        <a:font script="Laoo" typeface="DokChampa"/>
+        <a:font script="Sinh" typeface="Iskoola Pota"/>
+        <a:font script="Mong" typeface="Mongolian Baiti"/>
+        <a:font script="Viet" typeface="Arial"/>
+        <a:font script="Uigh" typeface="Microsoft Uighur"/>
+        <a:font script="Geor" typeface="Sylfaen"/>
+      </a:minorFont>
+    </a:fontScheme>
+    <a:fmtScheme name="Office">
+      <a:fillStyleLst>
+        <a:solidFill>
+          <a:schemeClr val="phClr"/>
+        </a:solidFill>
+        <a:gradFill rotWithShape="1">
+          <a:gsLst>
+            <a:gs pos="0">
+              <a:schemeClr val="phClr">
+                <a:tint val="50000"/>
+                <a:satMod val="300000"/>
+              </a:schemeClr>
+            </a:gs>
+            <a:gs pos="35000">
+              <a:schemeClr val="phClr">
+                <a:tint val="37000"/>
+                <a:satMod val="300000"/>
+              </a:schemeClr>
+            </a:gs>
+            <a:gs pos="100000">
+              <a:schemeClr val="phClr">
+                <a:tint val="15000"/>
+                <a:satMod val="350000"/>
+              </a:schemeClr>
+            </a:gs>
+          </a:gsLst>
+          <a:lin ang="16200000" scaled="1"/>
+        </a:gradFill>
+        <a:gradFill rotWithShape="1">
+          <a:gsLst>
+            <a:gs pos="0">
+              <a:schemeClr val="phClr">
+                <a:shade val="51000"/>
+                <a:satMod val="130000"/>
+              </a:schemeClr>
+            </a:gs>
+            <a:gs pos="80000">
+              <a:schemeClr val="phClr">
+                <a:shade val="93000"/>
+                <a:satMod val="130000"/>
+              </a:schemeClr>
+            </a:gs>
+            <a:gs pos="100000">
+              <a:schemeClr val="phClr">
+                <a:shade val="94000"/>
+                <a:satMod val="135000"/>
+              </a:schemeClr>
+            </a:gs>
+          </a:gsLst>
+          <a:lin ang="16200000" scaled="0"/>
+        </a:gradFill>
+      </a:fillStyleLst>
+      <a:lnStyleLst>
+        <a:ln w="9525" cap="flat" cmpd="sng" algn="ctr">
+          <a:solidFill>
+            <a:schemeClr val="phClr">
+              <a:shade val="95000"/>
+              <a:satMod val="105000"/>
+            </a:schemeClr>
+          </a:solidFill>
+          <a:prstDash val="solid"/>
+        </a:ln>
+        <a:ln w="25400" cap="flat" cmpd="sng" algn="ctr">
+          <a:solidFill>
+            <a:schemeClr val="phClr"/>
+          </a:solidFill>
+          <a:prstDash val="solid"/>
+        </a:ln>
+        <a:ln w="38100" cap="flat" cmpd="sng" algn="ctr">
+          <a:solidFill>
+            <a:schemeClr val="phClr"/>
+          </a:solidFill>
+          <a:prstDash val="solid"/>
+        </a:ln>
+      </a:lnStyleLst>
+      <a:effectStyleLst>
+        <a:effectStyle>
+          <a:effectLst>
+            <a:outerShdw blurRad="40000" dist="20000" dir="5400000" rotWithShape="0">
+              <a:srgbClr val="000000">
+                <a:alpha val="38000"/>
+              </a:srgbClr>
+            </a:outerShdw>
+          </a:effectLst>
+        </a:effectStyle>
+        <a:effectStyle>
+          <a:effectLst>
+            <a:outerShdw blurRad="40000" dist="23000" dir="5400000" rotWithShape="0">
+              <a:srgbClr val="000000">
+                <a:alpha val="35000"/>
+              </a:srgbClr>
+            </a:outerShdw>
+          </a:effectLst>
+        </a:effectStyle>
+        <a:effectStyle>
+          <a:effectLst>
+            <a:outerShdw blurRad="40000" dist="23000" dir="5400000" rotWithShape="0">
+              <a:srgbClr val="000000">
+                <a:alpha val="35000"/>
+              </a:srgbClr>
+            </a:outerShdw>
+          </a:effectLst>
+          <a:scene3d>
+            <a:camera prst="orthographicFront">
+              <a:rot lat="0" lon="0" rev="0"/>
+            </a:camera>
+            <a:lightRig rig="threePt" dir="t">
+              <a:rot lat="0" lon="0" rev="1200000"/>
+            </a:lightRig>
+          </a:scene3d>
+          <a:sp3d>
+            <a:bevelT w="63500" h="25400"/>
+          </a:sp3d>
+        </a:effectStyle>
+      </a:effectStyleLst>
+      <a:bgFillStyleLst>
+        <a:solidFill>
+          <a:schemeClr val="phClr"/>
+        </a:solidFill>
+        <a:gradFill rotWithShape="1">
+          <a:gsLst>
+            <a:gs pos="0">
+              <a:schemeClr val="phClr">
+                <a:tint val="40000"/>
+                <a:satMod val="350000"/>
+              </a:schemeClr>
+            </a:gs>
+            <a:gs pos="40000">
+              <a:schemeClr val="phClr">
+                <a:tint val="45000"/>
+                <a:shade val="99000"/>
+                <a:satMod val="350000"/>
+              </a:schemeClr>
+            </a:gs>
+            <a:gs pos="100000">
+              <a:schemeClr val="phClr">
+                <a:shade val="20000"/>
+                <a:satMod val="255000"/>
+              </a:schemeClr>
+            </a:gs>
+          </a:gsLst>
+          <a:path path="circle">
+            <a:fillToRect l="50000" t="-80000" r="50000" b="180000"/>
+          </a:path>
+        </a:gradFill>
+        <a:gradFill rotWithShape="1">
+          <a:gsLst>
+            <a:gs pos="0">
+              <a:schemeClr val="phClr">
+                <a:tint val="80000"/>
+                <a:satMod val="300000"/>
+              </a:schemeClr>
+            </a:gs>
+            <a:gs pos="100000">
+              <a:schemeClr val="phClr">
+                <a:shade val="30000"/>
+                <a:satMod val="200000"/>
+              </a:schemeClr>
+            </a:gs>
+          </a:gsLst>
+          <a:path path="circle">
+            <a:fillToRect l="50000" t="50000" r="50000" b="50000"/>
+          </a:path>
+        </a:gradFill>
+      </a:bgFillStyleLst>
+    </a:fmtScheme>
+  </a:themeElements>
+  <a:objectDefaults/>
+  <a:extraClrSchemeLst/>
+</a:theme>
 </file>
</xml_diff>

<commit_message>
Added background to prototype; added missing card
</commit_message>
<xml_diff>
--- a/HueHueBakersDozenSolitaire/HueHueBakersDozenSolitaireContent/Prototype.pptx
+++ b/HueHueBakersDozenSolitaire/HueHueBakersDozenSolitaireContent/Prototype.pptx
@@ -3534,7 +3534,7 @@
       </p:grpSpPr>
       <p:pic>
         <p:nvPicPr>
-          <p:cNvPr id="56" name="Picture 32" descr="C:\Users\Han Htet\Documents\GitHub\HueHueBakersDozenSolitaire\HueHueBakersDozenSolitaire\HueHueBakersDozenSolitaireContent\DiamondsKing.bmp"/>
+          <p:cNvPr id="1027" name="Picture 3" descr="C:\Users\Han Htet\Documents\GitHub\HueHueBakersDozenSolitaire\Paper Prototype Background Temp.PNG"/>
           <p:cNvPicPr>
             <a:picLocks noChangeAspect="1" noChangeArrowheads="1"/>
           </p:cNvPicPr>
@@ -3555,8 +3555,8 @@
         </p:blipFill>
         <p:spPr bwMode="auto">
           <a:xfrm>
-            <a:off x="4166434" y="146629"/>
-            <a:ext cx="634166" cy="854362"/>
+            <a:off x="1379" y="-85726"/>
+            <a:ext cx="9143999" cy="5229226"/>
           </a:xfrm>
           <a:prstGeom prst="rect">
             <a:avLst/>
@@ -3575,7 +3575,7 @@
       </p:pic>
       <p:pic>
         <p:nvPicPr>
-          <p:cNvPr id="57" name="Picture 51" descr="C:\Users\Han Htet\Documents\GitHub\HueHueBakersDozenSolitaire\HueHueBakersDozenSolitaire\HueHueBakersDozenSolitaireContent\HeartsThree.bmp"/>
+          <p:cNvPr id="56" name="Picture 32" descr="C:\Users\Han Htet\Documents\GitHub\HueHueBakersDozenSolitaire\HueHueBakersDozenSolitaire\HueHueBakersDozenSolitaireContent\DiamondsKing.bmp"/>
           <p:cNvPicPr>
             <a:picLocks noChangeAspect="1" noChangeArrowheads="1"/>
           </p:cNvPicPr>
@@ -3596,7 +3596,7 @@
         </p:blipFill>
         <p:spPr bwMode="auto">
           <a:xfrm>
-            <a:off x="2159737" y="146629"/>
+            <a:off x="4573378" y="673692"/>
             <a:ext cx="634166" cy="854362"/>
           </a:xfrm>
           <a:prstGeom prst="rect">
@@ -3616,7 +3616,7 @@
       </p:pic>
       <p:pic>
         <p:nvPicPr>
-          <p:cNvPr id="58" name="Picture 53" descr="C:\Users\Han Htet\Documents\GitHub\HueHueBakersDozenSolitaire\HueHueBakersDozenSolitaire\HueHueBakersDozenSolitaireContent\SpadesAce.bmp"/>
+          <p:cNvPr id="57" name="Picture 51" descr="C:\Users\Han Htet\Documents\GitHub\HueHueBakersDozenSolitaire\HueHueBakersDozenSolitaire\HueHueBakersDozenSolitaireContent\HeartsThree.bmp"/>
           <p:cNvPicPr>
             <a:picLocks noChangeAspect="1" noChangeArrowheads="1"/>
           </p:cNvPicPr>
@@ -3637,7 +3637,7 @@
         </p:blipFill>
         <p:spPr bwMode="auto">
           <a:xfrm>
-            <a:off x="124691" y="146629"/>
+            <a:off x="2487211" y="673692"/>
             <a:ext cx="634166" cy="854362"/>
           </a:xfrm>
           <a:prstGeom prst="rect">
@@ -3657,7 +3657,7 @@
       </p:pic>
       <p:pic>
         <p:nvPicPr>
-          <p:cNvPr id="59" name="Picture 2" descr="C:\Users\Han Htet\Documents\GitHub\HueHueBakersDozenSolitaire\HueHueBakersDozenSolitaire\HueHueBakersDozenSolitaireContent\SpadesEight.bmp"/>
+          <p:cNvPr id="58" name="Picture 53" descr="C:\Users\Han Htet\Documents\GitHub\HueHueBakersDozenSolitaire\HueHueBakersDozenSolitaire\HueHueBakersDozenSolitaireContent\SpadesAce.bmp"/>
           <p:cNvPicPr>
             <a:picLocks noChangeAspect="1" noChangeArrowheads="1"/>
           </p:cNvPicPr>
@@ -3678,7 +3678,7 @@
         </p:blipFill>
         <p:spPr bwMode="auto">
           <a:xfrm>
-            <a:off x="2166664" y="462397"/>
+            <a:off x="356241" y="682927"/>
             <a:ext cx="634166" cy="854362"/>
           </a:xfrm>
           <a:prstGeom prst="rect">
@@ -3698,7 +3698,7 @@
       </p:pic>
       <p:pic>
         <p:nvPicPr>
-          <p:cNvPr id="60" name="Picture 4" descr="C:\Users\Han Htet\Documents\GitHub\HueHueBakersDozenSolitaire\HueHueBakersDozenSolitaire\HueHueBakersDozenSolitaireContent\SpadesFour.bmp"/>
+          <p:cNvPr id="59" name="Picture 2" descr="C:\Users\Han Htet\Documents\GitHub\HueHueBakersDozenSolitaire\HueHueBakersDozenSolitaire\HueHueBakersDozenSolitaireContent\SpadesEight.bmp"/>
           <p:cNvPicPr>
             <a:picLocks noChangeAspect="1" noChangeArrowheads="1"/>
           </p:cNvPicPr>
@@ -3719,7 +3719,7 @@
         </p:blipFill>
         <p:spPr bwMode="auto">
           <a:xfrm>
-            <a:off x="5517894" y="2969491"/>
+            <a:off x="2494138" y="989460"/>
             <a:ext cx="634166" cy="854362"/>
           </a:xfrm>
           <a:prstGeom prst="rect">
@@ -3739,7 +3739,7 @@
       </p:pic>
       <p:pic>
         <p:nvPicPr>
-          <p:cNvPr id="61" name="Picture 6" descr="C:\Users\Han Htet\Documents\GitHub\HueHueBakersDozenSolitaire\HueHueBakersDozenSolitaire\HueHueBakersDozenSolitaireContent\SpadesKing.bmp"/>
+          <p:cNvPr id="60" name="Picture 4" descr="C:\Users\Han Htet\Documents\GitHub\HueHueBakersDozenSolitaire\HueHueBakersDozenSolitaire\HueHueBakersDozenSolitaireContent\SpadesFour.bmp"/>
           <p:cNvPicPr>
             <a:picLocks noChangeAspect="1" noChangeArrowheads="1"/>
           </p:cNvPicPr>
@@ -3760,7 +3760,7 @@
         </p:blipFill>
         <p:spPr bwMode="auto">
           <a:xfrm>
-            <a:off x="124691" y="2976417"/>
+            <a:off x="6159950" y="3222333"/>
             <a:ext cx="634166" cy="854362"/>
           </a:xfrm>
           <a:prstGeom prst="rect">
@@ -3780,7 +3780,7 @@
       </p:pic>
       <p:pic>
         <p:nvPicPr>
-          <p:cNvPr id="62" name="Picture 9" descr="C:\Users\Han Htet\Documents\GitHub\HueHueBakersDozenSolitaire\HueHueBakersDozenSolitaire\HueHueBakersDozenSolitaireContent\SpadesSeven.bmp"/>
+          <p:cNvPr id="61" name="Picture 6" descr="C:\Users\Han Htet\Documents\GitHub\HueHueBakersDozenSolitaire\HueHueBakersDozenSolitaire\HueHueBakersDozenSolitaireContent\SpadesKing.bmp"/>
           <p:cNvPicPr>
             <a:picLocks noChangeAspect="1" noChangeArrowheads="1"/>
           </p:cNvPicPr>
@@ -3801,7 +3801,7 @@
         </p:blipFill>
         <p:spPr bwMode="auto">
           <a:xfrm>
-            <a:off x="4483517" y="2976417"/>
+            <a:off x="917158" y="3213673"/>
             <a:ext cx="634166" cy="854362"/>
           </a:xfrm>
           <a:prstGeom prst="rect">
@@ -3821,7 +3821,7 @@
       </p:pic>
       <p:pic>
         <p:nvPicPr>
-          <p:cNvPr id="63" name="Picture 14" descr="C:\Users\Han Htet\Documents\GitHub\HueHueBakersDozenSolitaire\HueHueBakersDozenSolitaire\HueHueBakersDozenSolitaireContent\ClubsAce.bmp"/>
+          <p:cNvPr id="62" name="Picture 9" descr="C:\Users\Han Htet\Documents\GitHub\HueHueBakersDozenSolitaire\HueHueBakersDozenSolitaire\HueHueBakersDozenSolitaireContent\SpadesSeven.bmp"/>
           <p:cNvPicPr>
             <a:picLocks noChangeAspect="1" noChangeArrowheads="1"/>
           </p:cNvPicPr>
@@ -3842,7 +3842,7 @@
         </p:blipFill>
         <p:spPr bwMode="auto">
           <a:xfrm>
-            <a:off x="2170128" y="739489"/>
+            <a:off x="5125573" y="3229259"/>
             <a:ext cx="634166" cy="854362"/>
           </a:xfrm>
           <a:prstGeom prst="rect">
@@ -3862,7 +3862,7 @@
       </p:pic>
       <p:pic>
         <p:nvPicPr>
-          <p:cNvPr id="64" name="Picture 17" descr="C:\Users\Han Htet\Documents\GitHub\HueHueBakersDozenSolitaire\HueHueBakersDozenSolitaire\HueHueBakersDozenSolitaireContent\ClubsFour.bmp"/>
+          <p:cNvPr id="63" name="Picture 14" descr="C:\Users\Han Htet\Documents\GitHub\HueHueBakersDozenSolitaire\HueHueBakersDozenSolitaire\HueHueBakersDozenSolitaireContent\ClubsAce.bmp"/>
           <p:cNvPicPr>
             <a:picLocks noChangeAspect="1" noChangeArrowheads="1"/>
           </p:cNvPicPr>
@@ -3883,7 +3883,7 @@
         </p:blipFill>
         <p:spPr bwMode="auto">
           <a:xfrm>
-            <a:off x="1136073" y="565730"/>
+            <a:off x="2497602" y="1266552"/>
             <a:ext cx="634166" cy="854362"/>
           </a:xfrm>
           <a:prstGeom prst="rect">
@@ -3903,7 +3903,7 @@
       </p:pic>
       <p:pic>
         <p:nvPicPr>
-          <p:cNvPr id="65" name="Picture 18" descr="C:\Users\Han Htet\Documents\GitHub\HueHueBakersDozenSolitaire\HueHueBakersDozenSolitaire\HueHueBakersDozenSolitaireContent\ClubsJack.bmp"/>
+          <p:cNvPr id="64" name="Picture 17" descr="C:\Users\Han Htet\Documents\GitHub\HueHueBakersDozenSolitaire\HueHueBakersDozenSolitaire\HueHueBakersDozenSolitaireContent\ClubsFour.bmp"/>
           <p:cNvPicPr>
             <a:picLocks noChangeAspect="1" noChangeArrowheads="1"/>
           </p:cNvPicPr>
@@ -3924,7 +3924,7 @@
         </p:blipFill>
         <p:spPr bwMode="auto">
           <a:xfrm>
-            <a:off x="4166434" y="419680"/>
+            <a:off x="1417654" y="1102028"/>
             <a:ext cx="634166" cy="854362"/>
           </a:xfrm>
           <a:prstGeom prst="rect">
@@ -3944,7 +3944,7 @@
       </p:pic>
       <p:pic>
         <p:nvPicPr>
-          <p:cNvPr id="66" name="Picture 19" descr="C:\Users\Han Htet\Documents\GitHub\HueHueBakersDozenSolitaire\HueHueBakersDozenSolitaire\HueHueBakersDozenSolitaireContent\ClubsKing.bmp"/>
+          <p:cNvPr id="65" name="Picture 18" descr="C:\Users\Han Htet\Documents\GitHub\HueHueBakersDozenSolitaire\HueHueBakersDozenSolitaire\HueHueBakersDozenSolitaireContent\ClubsJack.bmp"/>
           <p:cNvPicPr>
             <a:picLocks noChangeAspect="1" noChangeArrowheads="1"/>
           </p:cNvPicPr>
@@ -3965,7 +3965,7 @@
         </p:blipFill>
         <p:spPr bwMode="auto">
           <a:xfrm>
-            <a:off x="3200400" y="146629"/>
+            <a:off x="4573378" y="946743"/>
             <a:ext cx="634166" cy="854362"/>
           </a:xfrm>
           <a:prstGeom prst="rect">
@@ -3985,7 +3985,7 @@
       </p:pic>
       <p:pic>
         <p:nvPicPr>
-          <p:cNvPr id="67" name="Picture 25" descr="C:\Users\Han Htet\Documents\GitHub\HueHueBakersDozenSolitaire\HueHueBakersDozenSolitaire\HueHueBakersDozenSolitaireContent\ClubsThree.bmp"/>
+          <p:cNvPr id="66" name="Picture 19" descr="C:\Users\Han Htet\Documents\GitHub\HueHueBakersDozenSolitaire\HueHueBakersDozenSolitaire\HueHueBakersDozenSolitaireContent\ClubsKing.bmp"/>
           <p:cNvPicPr>
             <a:picLocks noChangeAspect="1" noChangeArrowheads="1"/>
           </p:cNvPicPr>
@@ -4006,7 +4006,7 @@
         </p:blipFill>
         <p:spPr bwMode="auto">
           <a:xfrm>
-            <a:off x="1143000" y="137394"/>
+            <a:off x="3505200" y="682927"/>
             <a:ext cx="634166" cy="854362"/>
           </a:xfrm>
           <a:prstGeom prst="rect">
@@ -4026,7 +4026,7 @@
       </p:pic>
       <p:pic>
         <p:nvPicPr>
-          <p:cNvPr id="68" name="Picture 28" descr="C:\Users\Han Htet\Documents\GitHub\HueHueBakersDozenSolitaire\HueHueBakersDozenSolitaire\HueHueBakersDozenSolitaireContent\DiamondsEight.bmp"/>
+          <p:cNvPr id="67" name="Picture 25" descr="C:\Users\Han Htet\Documents\GitHub\HueHueBakersDozenSolitaire\HueHueBakersDozenSolitaire\HueHueBakersDozenSolitaireContent\ClubsThree.bmp"/>
           <p:cNvPicPr>
             <a:picLocks noChangeAspect="1" noChangeArrowheads="1"/>
           </p:cNvPicPr>
@@ -4047,7 +4047,7 @@
         </p:blipFill>
         <p:spPr bwMode="auto">
           <a:xfrm>
-            <a:off x="2170128" y="2961412"/>
+            <a:off x="1424581" y="673692"/>
             <a:ext cx="634166" cy="854362"/>
           </a:xfrm>
           <a:prstGeom prst="rect">
@@ -4067,7 +4067,7 @@
       </p:pic>
       <p:pic>
         <p:nvPicPr>
-          <p:cNvPr id="69" name="Picture 34" descr="C:\Users\Han Htet\Documents\GitHub\HueHueBakersDozenSolitaire\HueHueBakersDozenSolitaire\HueHueBakersDozenSolitaireContent\DiamondsQueen.bmp"/>
+          <p:cNvPr id="68" name="Picture 28" descr="C:\Users\Han Htet\Documents\GitHub\HueHueBakersDozenSolitaire\HueHueBakersDozenSolitaire\HueHueBakersDozenSolitaireContent\DiamondsEight.bmp"/>
           <p:cNvPicPr>
             <a:picLocks noChangeAspect="1" noChangeArrowheads="1"/>
           </p:cNvPicPr>
@@ -4088,7 +4088,7 @@
         </p:blipFill>
         <p:spPr bwMode="auto">
           <a:xfrm>
-            <a:off x="3306201" y="2961412"/>
+            <a:off x="2962595" y="3198668"/>
             <a:ext cx="634166" cy="854362"/>
           </a:xfrm>
           <a:prstGeom prst="rect">
@@ -4108,7 +4108,7 @@
       </p:pic>
       <p:pic>
         <p:nvPicPr>
-          <p:cNvPr id="70" name="Picture 35" descr="C:\Users\Han Htet\Documents\GitHub\HueHueBakersDozenSolitaire\HueHueBakersDozenSolitaire\HueHueBakersDozenSolitaireContent\DiamondsSeven.bmp"/>
+          <p:cNvPr id="69" name="Picture 34" descr="C:\Users\Han Htet\Documents\GitHub\HueHueBakersDozenSolitaire\HueHueBakersDozenSolitaire\HueHueBakersDozenSolitaireContent\DiamondsQueen.bmp"/>
           <p:cNvPicPr>
             <a:picLocks noChangeAspect="1" noChangeArrowheads="1"/>
           </p:cNvPicPr>
@@ -4129,7 +4129,7 @@
         </p:blipFill>
         <p:spPr bwMode="auto">
           <a:xfrm>
-            <a:off x="4166434" y="703118"/>
+            <a:off x="4038600" y="3206747"/>
             <a:ext cx="634166" cy="854362"/>
           </a:xfrm>
           <a:prstGeom prst="rect">
@@ -4149,7 +4149,7 @@
       </p:pic>
       <p:pic>
         <p:nvPicPr>
-          <p:cNvPr id="71" name="Picture 38" descr="C:\Users\Han Htet\Documents\GitHub\HueHueBakersDozenSolitaire\HueHueBakersDozenSolitaire\HueHueBakersDozenSolitaireContent\DiamondsThree.bmp"/>
+          <p:cNvPr id="70" name="Picture 35" descr="C:\Users\Han Htet\Documents\GitHub\HueHueBakersDozenSolitaire\HueHueBakersDozenSolitaire\HueHueBakersDozenSolitaireContent\DiamondsSeven.bmp"/>
           <p:cNvPicPr>
             <a:picLocks noChangeAspect="1" noChangeArrowheads="1"/>
           </p:cNvPicPr>
@@ -4170,7 +4170,7 @@
         </p:blipFill>
         <p:spPr bwMode="auto">
           <a:xfrm>
-            <a:off x="124691" y="431222"/>
+            <a:off x="4573378" y="1230181"/>
             <a:ext cx="634166" cy="854362"/>
           </a:xfrm>
           <a:prstGeom prst="rect">
@@ -4190,7 +4190,7 @@
       </p:pic>
       <p:pic>
         <p:nvPicPr>
-          <p:cNvPr id="72" name="Picture 37" descr="C:\Users\Han Htet\Documents\GitHub\HueHueBakersDozenSolitaire\HueHueBakersDozenSolitaire\HueHueBakersDozenSolitaireContent\DiamondsTen.bmp"/>
+          <p:cNvPr id="71" name="Picture 38" descr="C:\Users\Han Htet\Documents\GitHub\HueHueBakersDozenSolitaire\HueHueBakersDozenSolitaire\HueHueBakersDozenSolitaireContent\DiamondsThree.bmp"/>
           <p:cNvPicPr>
             <a:picLocks noChangeAspect="1" noChangeArrowheads="1"/>
           </p:cNvPicPr>
@@ -4211,7 +4211,7 @@
         </p:blipFill>
         <p:spPr bwMode="auto">
           <a:xfrm>
-            <a:off x="124691" y="731980"/>
+            <a:off x="356241" y="967520"/>
             <a:ext cx="634166" cy="854362"/>
           </a:xfrm>
           <a:prstGeom prst="rect">
@@ -4231,7 +4231,7 @@
       </p:pic>
       <p:pic>
         <p:nvPicPr>
-          <p:cNvPr id="73" name="Picture 41" descr="C:\Users\Han Htet\Documents\GitHub\HueHueBakersDozenSolitaire\HueHueBakersDozenSolitaire\HueHueBakersDozenSolitaireContent\HeartsEight.bmp"/>
+          <p:cNvPr id="72" name="Picture 37" descr="C:\Users\Han Htet\Documents\GitHub\HueHueBakersDozenSolitaire\HueHueBakersDozenSolitaire\HueHueBakersDozenSolitaireContent\DiamondsTen.bmp"/>
           <p:cNvPicPr>
             <a:picLocks noChangeAspect="1" noChangeArrowheads="1"/>
           </p:cNvPicPr>
@@ -4252,7 +4252,7 @@
         </p:blipFill>
         <p:spPr bwMode="auto">
           <a:xfrm>
-            <a:off x="1143000" y="2969491"/>
+            <a:off x="356241" y="1268278"/>
             <a:ext cx="634166" cy="854362"/>
           </a:xfrm>
           <a:prstGeom prst="rect">
@@ -4272,7 +4272,7 @@
       </p:pic>
       <p:pic>
         <p:nvPicPr>
-          <p:cNvPr id="74" name="Picture 43" descr="C:\Users\Han Htet\Documents\GitHub\HueHueBakersDozenSolitaire\HueHueBakersDozenSolitaire\HueHueBakersDozenSolitaireContent\HeartsFour.bmp"/>
+          <p:cNvPr id="73" name="Picture 41" descr="C:\Users\Han Htet\Documents\GitHub\HueHueBakersDozenSolitaire\HueHueBakersDozenSolitaire\HueHueBakersDozenSolitaireContent\HeartsEight.bmp"/>
           <p:cNvPicPr>
             <a:picLocks noChangeAspect="1" noChangeArrowheads="1"/>
           </p:cNvPicPr>
@@ -4293,7 +4293,7 @@
         </p:blipFill>
         <p:spPr bwMode="auto">
           <a:xfrm>
-            <a:off x="4483517" y="3274290"/>
+            <a:off x="1935467" y="3206747"/>
             <a:ext cx="634166" cy="854362"/>
           </a:xfrm>
           <a:prstGeom prst="rect">
@@ -4313,7 +4313,7 @@
       </p:pic>
       <p:pic>
         <p:nvPicPr>
-          <p:cNvPr id="75" name="Picture 45" descr="C:\Users\Han Htet\Documents\GitHub\HueHueBakersDozenSolitaire\HueHueBakersDozenSolitaire\HueHueBakersDozenSolitaireContent\HeartsKing.bmp"/>
+          <p:cNvPr id="74" name="Picture 43" descr="C:\Users\Han Htet\Documents\GitHub\HueHueBakersDozenSolitaire\HueHueBakersDozenSolitaire\HueHueBakersDozenSolitaireContent\HeartsFour.bmp"/>
           <p:cNvPicPr>
             <a:picLocks noChangeAspect="1" noChangeArrowheads="1"/>
           </p:cNvPicPr>
@@ -4334,7 +4334,7 @@
         </p:blipFill>
         <p:spPr bwMode="auto">
           <a:xfrm>
-            <a:off x="6236117" y="146629"/>
+            <a:off x="5125573" y="3527132"/>
             <a:ext cx="634166" cy="854362"/>
           </a:xfrm>
           <a:prstGeom prst="rect">
@@ -4354,7 +4354,7 @@
       </p:pic>
       <p:pic>
         <p:nvPicPr>
-          <p:cNvPr id="76" name="Picture 48" descr="C:\Users\Han Htet\Documents\GitHub\HueHueBakersDozenSolitaire\HueHueBakersDozenSolitaire\HueHueBakersDozenSolitaireContent\HeartsSeven.bmp"/>
+          <p:cNvPr id="75" name="Picture 45" descr="C:\Users\Han Htet\Documents\GitHub\HueHueBakersDozenSolitaire\HueHueBakersDozenSolitaire\HueHueBakersDozenSolitaireContent\HeartsKing.bmp"/>
           <p:cNvPicPr>
             <a:picLocks noChangeAspect="1" noChangeArrowheads="1"/>
           </p:cNvPicPr>
@@ -4375,7 +4375,7 @@
         </p:blipFill>
         <p:spPr bwMode="auto">
           <a:xfrm>
-            <a:off x="5148856" y="154143"/>
+            <a:off x="6705600" y="703140"/>
             <a:ext cx="634166" cy="854362"/>
           </a:xfrm>
           <a:prstGeom prst="rect">
@@ -4395,7 +4395,7 @@
       </p:pic>
       <p:pic>
         <p:nvPicPr>
-          <p:cNvPr id="77" name="Picture 46" descr="C:\Users\Han Htet\Documents\GitHub\HueHueBakersDozenSolitaire\HueHueBakersDozenSolitaire\HueHueBakersDozenSolitaireContent\HeartsNine.bmp"/>
+          <p:cNvPr id="76" name="Picture 48" descr="C:\Users\Han Htet\Documents\GitHub\HueHueBakersDozenSolitaire\HueHueBakersDozenSolitaire\HueHueBakersDozenSolitaireContent\HeartsSeven.bmp"/>
           <p:cNvPicPr>
             <a:picLocks noChangeAspect="1" noChangeArrowheads="1"/>
           </p:cNvPicPr>
@@ -4416,7 +4416,7 @@
         </p:blipFill>
         <p:spPr bwMode="auto">
           <a:xfrm>
-            <a:off x="124691" y="3301998"/>
+            <a:off x="5623536" y="682927"/>
             <a:ext cx="634166" cy="854362"/>
           </a:xfrm>
           <a:prstGeom prst="rect">
@@ -4436,7 +4436,7 @@
       </p:pic>
       <p:pic>
         <p:nvPicPr>
-          <p:cNvPr id="78" name="Picture 49" descr="C:\Users\Han Htet\Documents\GitHub\HueHueBakersDozenSolitaire\HueHueBakersDozenSolitaire\HueHueBakersDozenSolitaireContent\HeartsSix.bmp"/>
+          <p:cNvPr id="77" name="Picture 46" descr="C:\Users\Han Htet\Documents\GitHub\HueHueBakersDozenSolitaire\HueHueBakersDozenSolitaire\HueHueBakersDozenSolitaireContent\HeartsNine.bmp"/>
           <p:cNvPicPr>
             <a:picLocks noChangeAspect="1" noChangeArrowheads="1"/>
           </p:cNvPicPr>
@@ -4457,7 +4457,7 @@
         </p:blipFill>
         <p:spPr bwMode="auto">
           <a:xfrm>
-            <a:off x="3200400" y="438152"/>
+            <a:off x="917158" y="3539254"/>
             <a:ext cx="634166" cy="854362"/>
           </a:xfrm>
           <a:prstGeom prst="rect">
@@ -4477,7 +4477,7 @@
       </p:pic>
       <p:pic>
         <p:nvPicPr>
-          <p:cNvPr id="79" name="Picture 50" descr="C:\Users\Han Htet\Documents\GitHub\HueHueBakersDozenSolitaire\HueHueBakersDozenSolitaire\HueHueBakersDozenSolitaireContent\HeartsTen.bmp"/>
+          <p:cNvPr id="78" name="Picture 49" descr="C:\Users\Han Htet\Documents\GitHub\HueHueBakersDozenSolitaire\HueHueBakersDozenSolitaire\HueHueBakersDozenSolitaireContent\HeartsSix.bmp"/>
           <p:cNvPicPr>
             <a:picLocks noChangeAspect="1" noChangeArrowheads="1"/>
           </p:cNvPicPr>
@@ -4498,7 +4498,7 @@
         </p:blipFill>
         <p:spPr bwMode="auto">
           <a:xfrm>
-            <a:off x="3200400" y="696767"/>
+            <a:off x="3505200" y="974450"/>
             <a:ext cx="634166" cy="854362"/>
           </a:xfrm>
           <a:prstGeom prst="rect">
@@ -4518,7 +4518,7 @@
       </p:pic>
       <p:pic>
         <p:nvPicPr>
-          <p:cNvPr id="80" name="Picture 52" descr="C:\Users\Han Htet\Documents\GitHub\HueHueBakersDozenSolitaire\HueHueBakersDozenSolitaire\HueHueBakersDozenSolitaireContent\HeartsTwo.bmp"/>
+          <p:cNvPr id="79" name="Picture 50" descr="C:\Users\Han Htet\Documents\GitHub\HueHueBakersDozenSolitaire\HueHueBakersDozenSolitaire\HueHueBakersDozenSolitaireContent\HeartsTen.bmp"/>
           <p:cNvPicPr>
             <a:picLocks noChangeAspect="1" noChangeArrowheads="1"/>
           </p:cNvPicPr>
@@ -4539,7 +4539,7 @@
         </p:blipFill>
         <p:spPr bwMode="auto">
           <a:xfrm>
-            <a:off x="1136073" y="438152"/>
+            <a:off x="3505200" y="1233065"/>
             <a:ext cx="634166" cy="854362"/>
           </a:xfrm>
           <a:prstGeom prst="rect">
@@ -4559,7 +4559,7 @@
       </p:pic>
       <p:pic>
         <p:nvPicPr>
-          <p:cNvPr id="81" name="Picture 36" descr="C:\Users\Han Htet\Documents\GitHub\HueHueBakersDozenSolitaire\HueHueBakersDozenSolitaire\HueHueBakersDozenSolitaireContent\DiamondsSix.bmp"/>
+          <p:cNvPr id="80" name="Picture 52" descr="C:\Users\Han Htet\Documents\GitHub\HueHueBakersDozenSolitaire\HueHueBakersDozenSolitaire\HueHueBakersDozenSolitaireContent\HeartsTwo.bmp"/>
           <p:cNvPicPr>
             <a:picLocks noChangeAspect="1" noChangeArrowheads="1"/>
           </p:cNvPicPr>
@@ -4580,7 +4580,7 @@
         </p:blipFill>
         <p:spPr bwMode="auto">
           <a:xfrm>
-            <a:off x="124691" y="1000991"/>
+            <a:off x="1417654" y="974450"/>
             <a:ext cx="634166" cy="854362"/>
           </a:xfrm>
           <a:prstGeom prst="rect">
@@ -4600,7 +4600,7 @@
       </p:pic>
       <p:pic>
         <p:nvPicPr>
-          <p:cNvPr id="82" name="Picture 23" descr="C:\Users\Han Htet\Documents\GitHub\HueHueBakersDozenSolitaire\HueHueBakersDozenSolitaire\HueHueBakersDozenSolitaireContent\ClubsSix.bmp"/>
+          <p:cNvPr id="81" name="Picture 36" descr="C:\Users\Han Htet\Documents\GitHub\HueHueBakersDozenSolitaire\HueHueBakersDozenSolitaire\HueHueBakersDozenSolitaireContent\DiamondsSix.bmp"/>
           <p:cNvPicPr>
             <a:picLocks noChangeAspect="1" noChangeArrowheads="1"/>
           </p:cNvPicPr>
@@ -4621,7 +4621,7 @@
         </p:blipFill>
         <p:spPr bwMode="auto">
           <a:xfrm>
-            <a:off x="2176735" y="1000991"/>
+            <a:off x="356241" y="1537289"/>
             <a:ext cx="634166" cy="854362"/>
           </a:xfrm>
           <a:prstGeom prst="rect">
@@ -4641,7 +4641,7 @@
       </p:pic>
       <p:pic>
         <p:nvPicPr>
-          <p:cNvPr id="83" name="Picture 33" descr="C:\Users\Han Htet\Documents\GitHub\HueHueBakersDozenSolitaire\HueHueBakersDozenSolitaire\HueHueBakersDozenSolitaireContent\DiamondsNine.bmp"/>
+          <p:cNvPr id="82" name="Picture 23" descr="C:\Users\Han Htet\Documents\GitHub\HueHueBakersDozenSolitaire\HueHueBakersDozenSolitaire\HueHueBakersDozenSolitaireContent\ClubsSix.bmp"/>
           <p:cNvPicPr>
             <a:picLocks noChangeAspect="1" noChangeArrowheads="1"/>
           </p:cNvPicPr>
@@ -4662,7 +4662,7 @@
         </p:blipFill>
         <p:spPr bwMode="auto">
           <a:xfrm>
-            <a:off x="3200400" y="1000991"/>
+            <a:off x="2504209" y="1528054"/>
             <a:ext cx="634166" cy="854362"/>
           </a:xfrm>
           <a:prstGeom prst="rect">
@@ -4682,7 +4682,7 @@
       </p:pic>
       <p:pic>
         <p:nvPicPr>
-          <p:cNvPr id="84" name="Picture 24" descr="C:\Users\Han Htet\Documents\GitHub\HueHueBakersDozenSolitaire\HueHueBakersDozenSolitaire\HueHueBakersDozenSolitaireContent\ClubsTen.bmp"/>
+          <p:cNvPr id="83" name="Picture 33" descr="C:\Users\Han Htet\Documents\GitHub\HueHueBakersDozenSolitaire\HueHueBakersDozenSolitaire\HueHueBakersDozenSolitaireContent\DiamondsNine.bmp"/>
           <p:cNvPicPr>
             <a:picLocks noChangeAspect="1" noChangeArrowheads="1"/>
           </p:cNvPicPr>
@@ -4703,7 +4703,7 @@
         </p:blipFill>
         <p:spPr bwMode="auto">
           <a:xfrm>
-            <a:off x="1136073" y="748725"/>
+            <a:off x="3505200" y="1537289"/>
             <a:ext cx="634166" cy="854362"/>
           </a:xfrm>
           <a:prstGeom prst="rect">
@@ -4723,7 +4723,7 @@
       </p:pic>
       <p:pic>
         <p:nvPicPr>
-          <p:cNvPr id="85" name="Picture 16" descr="C:\Users\Han Htet\Documents\GitHub\HueHueBakersDozenSolitaire\HueHueBakersDozenSolitaire\HueHueBakersDozenSolitaireContent\ClubsFive.bmp"/>
+          <p:cNvPr id="84" name="Picture 24" descr="C:\Users\Han Htet\Documents\GitHub\HueHueBakersDozenSolitaire\HueHueBakersDozenSolitaire\HueHueBakersDozenSolitaireContent\ClubsTen.bmp"/>
           <p:cNvPicPr>
             <a:picLocks noChangeAspect="1" noChangeArrowheads="1"/>
           </p:cNvPicPr>
@@ -4744,7 +4744,7 @@
         </p:blipFill>
         <p:spPr bwMode="auto">
           <a:xfrm>
-            <a:off x="1122218" y="1008505"/>
+            <a:off x="1417654" y="1285023"/>
             <a:ext cx="634166" cy="854362"/>
           </a:xfrm>
           <a:prstGeom prst="rect">
@@ -4764,7 +4764,7 @@
       </p:pic>
       <p:pic>
         <p:nvPicPr>
-          <p:cNvPr id="86" name="Picture 31" descr="C:\Users\Han Htet\Documents\GitHub\HueHueBakersDozenSolitaire\HueHueBakersDozenSolitaire\HueHueBakersDozenSolitaireContent\DiamondsJack.bmp"/>
+          <p:cNvPr id="85" name="Picture 16" descr="C:\Users\Han Htet\Documents\GitHub\HueHueBakersDozenSolitaire\HueHueBakersDozenSolitaire\HueHueBakersDozenSolitaireContent\ClubsFive.bmp"/>
           <p:cNvPicPr>
             <a:picLocks noChangeAspect="1" noChangeArrowheads="1"/>
           </p:cNvPicPr>
@@ -4785,7 +4785,7 @@
         </p:blipFill>
         <p:spPr bwMode="auto">
           <a:xfrm>
-            <a:off x="5148856" y="453740"/>
+            <a:off x="1403799" y="1544803"/>
             <a:ext cx="634166" cy="854362"/>
           </a:xfrm>
           <a:prstGeom prst="rect">
@@ -4805,7 +4805,7 @@
       </p:pic>
       <p:pic>
         <p:nvPicPr>
-          <p:cNvPr id="87" name="Picture 40" descr="C:\Users\Han Htet\Documents\GitHub\HueHueBakersDozenSolitaire\HueHueBakersDozenSolitaire\HueHueBakersDozenSolitaireContent\HeartsAce.bmp"/>
+          <p:cNvPr id="86" name="Picture 31" descr="C:\Users\Han Htet\Documents\GitHub\HueHueBakersDozenSolitaire\HueHueBakersDozenSolitaire\HueHueBakersDozenSolitaireContent\DiamondsJack.bmp"/>
           <p:cNvPicPr>
             <a:picLocks noChangeAspect="1" noChangeArrowheads="1"/>
           </p:cNvPicPr>
@@ -4826,7 +4826,7 @@
         </p:blipFill>
         <p:spPr bwMode="auto">
           <a:xfrm>
-            <a:off x="5176566" y="731980"/>
+            <a:off x="5623536" y="982524"/>
             <a:ext cx="634166" cy="854362"/>
           </a:xfrm>
           <a:prstGeom prst="rect">
@@ -4846,7 +4846,7 @@
       </p:pic>
       <p:pic>
         <p:nvPicPr>
-          <p:cNvPr id="88" name="Picture 13" descr="C:\Users\Han Htet\Documents\GitHub\HueHueBakersDozenSolitaire\HueHueBakersDozenSolitaire\HueHueBakersDozenSolitaireContent\SpadesTwo.bmp"/>
+          <p:cNvPr id="87" name="Picture 40" descr="C:\Users\Han Htet\Documents\GitHub\HueHueBakersDozenSolitaire\HueHueBakersDozenSolitaire\HueHueBakersDozenSolitaireContent\HeartsAce.bmp"/>
           <p:cNvPicPr>
             <a:picLocks noChangeAspect="1" noChangeArrowheads="1"/>
           </p:cNvPicPr>
@@ -4867,8 +4867,8 @@
         </p:blipFill>
         <p:spPr bwMode="auto">
           <a:xfrm>
-            <a:off x="5176566" y="1005395"/>
-            <a:ext cx="634166" cy="845554"/>
+            <a:off x="5651246" y="1260764"/>
+            <a:ext cx="634166" cy="854362"/>
           </a:xfrm>
           <a:prstGeom prst="rect">
             <a:avLst/>
@@ -4887,7 +4887,7 @@
       </p:pic>
       <p:pic>
         <p:nvPicPr>
-          <p:cNvPr id="89" name="Picture 26" descr="C:\Users\Han Htet\Documents\GitHub\HueHueBakersDozenSolitaire\HueHueBakersDozenSolitaire\HueHueBakersDozenSolitaireContent\ClubsTwo.bmp"/>
+          <p:cNvPr id="88" name="Picture 13" descr="C:\Users\Han Htet\Documents\GitHub\HueHueBakersDozenSolitaire\HueHueBakersDozenSolitaire\HueHueBakersDozenSolitaireContent\SpadesTwo.bmp"/>
           <p:cNvPicPr>
             <a:picLocks noChangeAspect="1" noChangeArrowheads="1"/>
           </p:cNvPicPr>
@@ -4908,8 +4908,8 @@
         </p:blipFill>
         <p:spPr bwMode="auto">
           <a:xfrm>
-            <a:off x="4166434" y="1000991"/>
-            <a:ext cx="634166" cy="854362"/>
+            <a:off x="5651246" y="1534179"/>
+            <a:ext cx="634166" cy="845554"/>
           </a:xfrm>
           <a:prstGeom prst="rect">
             <a:avLst/>
@@ -4928,7 +4928,7 @@
       </p:pic>
       <p:pic>
         <p:nvPicPr>
-          <p:cNvPr id="90" name="Picture 12" descr="C:\Users\Han Htet\Documents\GitHub\HueHueBakersDozenSolitaire\HueHueBakersDozenSolitaire\HueHueBakersDozenSolitaireContent\SpadesThree.bmp"/>
+          <p:cNvPr id="89" name="Picture 26" descr="C:\Users\Han Htet\Documents\GitHub\HueHueBakersDozenSolitaire\HueHueBakersDozenSolitaire\HueHueBakersDozenSolitaireContent\ClubsTwo.bmp"/>
           <p:cNvPicPr>
             <a:picLocks noChangeAspect="1" noChangeArrowheads="1"/>
           </p:cNvPicPr>
@@ -4949,7 +4949,7 @@
         </p:blipFill>
         <p:spPr bwMode="auto">
           <a:xfrm>
-            <a:off x="6210942" y="374086"/>
+            <a:off x="4573378" y="1528054"/>
             <a:ext cx="634166" cy="854362"/>
           </a:xfrm>
           <a:prstGeom prst="rect">
@@ -4969,7 +4969,7 @@
       </p:pic>
       <p:pic>
         <p:nvPicPr>
-          <p:cNvPr id="91" name="Picture 11" descr="C:\Users\Han Htet\Documents\GitHub\HueHueBakersDozenSolitaire\HueHueBakersDozenSolitaire\HueHueBakersDozenSolitaireContent\SpadesTen.bmp"/>
+          <p:cNvPr id="90" name="Picture 12" descr="C:\Users\Han Htet\Documents\GitHub\HueHueBakersDozenSolitaire\HueHueBakersDozenSolitaire\HueHueBakersDozenSolitaireContent\SpadesThree.bmp"/>
           <p:cNvPicPr>
             <a:picLocks noChangeAspect="1" noChangeArrowheads="1"/>
           </p:cNvPicPr>
@@ -4990,7 +4990,7 @@
         </p:blipFill>
         <p:spPr bwMode="auto">
           <a:xfrm>
-            <a:off x="6244649" y="587675"/>
+            <a:off x="6680425" y="930597"/>
             <a:ext cx="634166" cy="854362"/>
           </a:xfrm>
           <a:prstGeom prst="rect">
@@ -5010,7 +5010,7 @@
       </p:pic>
       <p:pic>
         <p:nvPicPr>
-          <p:cNvPr id="92" name="Picture 27" descr="C:\Users\Han Htet\Documents\GitHub\HueHueBakersDozenSolitaire\HueHueBakersDozenSolitaire\HueHueBakersDozenSolitaireContent\DiamondsAce.bmp"/>
+          <p:cNvPr id="91" name="Picture 11" descr="C:\Users\Han Htet\Documents\GitHub\HueHueBakersDozenSolitaire\HueHueBakersDozenSolitaire\HueHueBakersDozenSolitaireContent\SpadesTen.bmp"/>
           <p:cNvPicPr>
             <a:picLocks noChangeAspect="1" noChangeArrowheads="1"/>
           </p:cNvPicPr>
@@ -5031,7 +5031,7 @@
         </p:blipFill>
         <p:spPr bwMode="auto">
           <a:xfrm>
-            <a:off x="6236117" y="1007342"/>
+            <a:off x="6714132" y="1144186"/>
             <a:ext cx="634166" cy="854362"/>
           </a:xfrm>
           <a:prstGeom prst="rect">
@@ -5051,7 +5051,7 @@
       </p:pic>
       <p:pic>
         <p:nvPicPr>
-          <p:cNvPr id="93" name="Picture 22" descr="C:\Users\Han Htet\Documents\GitHub\HueHueBakersDozenSolitaire\HueHueBakersDozenSolitaire\HueHueBakersDozenSolitaireContent\ClubsSeven.bmp"/>
+          <p:cNvPr id="92" name="Picture 27" descr="C:\Users\Han Htet\Documents\GitHub\HueHueBakersDozenSolitaire\HueHueBakersDozenSolitaire\HueHueBakersDozenSolitaireContent\DiamondsAce.bmp"/>
           <p:cNvPicPr>
             <a:picLocks noChangeAspect="1" noChangeArrowheads="1"/>
           </p:cNvPicPr>
@@ -5072,7 +5072,7 @@
         </p:blipFill>
         <p:spPr bwMode="auto">
           <a:xfrm>
-            <a:off x="124691" y="3586017"/>
+            <a:off x="6705600" y="1563853"/>
             <a:ext cx="634166" cy="854362"/>
           </a:xfrm>
           <a:prstGeom prst="rect">
@@ -5092,7 +5092,7 @@
       </p:pic>
       <p:pic>
         <p:nvPicPr>
-          <p:cNvPr id="94" name="Picture 20" descr="C:\Users\Han Htet\Documents\GitHub\HueHueBakersDozenSolitaire\HueHueBakersDozenSolitaire\HueHueBakersDozenSolitaireContent\ClubsNine.bmp"/>
+          <p:cNvPr id="93" name="Picture 22" descr="C:\Users\Han Htet\Documents\GitHub\HueHueBakersDozenSolitaire\HueHueBakersDozenSolitaire\HueHueBakersDozenSolitaireContent\ClubsSeven.bmp"/>
           <p:cNvPicPr>
             <a:picLocks noChangeAspect="1" noChangeArrowheads="1"/>
           </p:cNvPicPr>
@@ -5113,7 +5113,7 @@
         </p:blipFill>
         <p:spPr bwMode="auto">
           <a:xfrm>
-            <a:off x="124691" y="3839439"/>
+            <a:off x="917158" y="3823273"/>
             <a:ext cx="634166" cy="854362"/>
           </a:xfrm>
           <a:prstGeom prst="rect">
@@ -5133,7 +5133,7 @@
       </p:pic>
       <p:pic>
         <p:nvPicPr>
-          <p:cNvPr id="95" name="Picture 15" descr="C:\Users\Han Htet\Documents\GitHub\HueHueBakersDozenSolitaire\HueHueBakersDozenSolitaire\HueHueBakersDozenSolitaireContent\ClubsEight.bmp"/>
+          <p:cNvPr id="94" name="Picture 20" descr="C:\Users\Han Htet\Documents\GitHub\HueHueBakersDozenSolitaire\HueHueBakersDozenSolitaire\HueHueBakersDozenSolitaireContent\ClubsNine.bmp"/>
           <p:cNvPicPr>
             <a:picLocks noChangeAspect="1" noChangeArrowheads="1"/>
           </p:cNvPicPr>
@@ -5154,7 +5154,7 @@
         </p:blipFill>
         <p:spPr bwMode="auto">
           <a:xfrm>
-            <a:off x="1143000" y="3314701"/>
+            <a:off x="917158" y="4076695"/>
             <a:ext cx="634166" cy="854362"/>
           </a:xfrm>
           <a:prstGeom prst="rect">
@@ -5174,7 +5174,7 @@
       </p:pic>
       <p:pic>
         <p:nvPicPr>
-          <p:cNvPr id="96" name="Picture 39" descr="C:\Users\Han Htet\Documents\GitHub\HueHueBakersDozenSolitaire\HueHueBakersDozenSolitaire\HueHueBakersDozenSolitaireContent\DiamondsTwo.bmp"/>
+          <p:cNvPr id="95" name="Picture 15" descr="C:\Users\Han Htet\Documents\GitHub\HueHueBakersDozenSolitaire\HueHueBakersDozenSolitaire\HueHueBakersDozenSolitaireContent\ClubsEight.bmp"/>
           <p:cNvPicPr>
             <a:picLocks noChangeAspect="1" noChangeArrowheads="1"/>
           </p:cNvPicPr>
@@ -5195,7 +5195,7 @@
         </p:blipFill>
         <p:spPr bwMode="auto">
           <a:xfrm>
-            <a:off x="1143000" y="3625849"/>
+            <a:off x="1935467" y="3551957"/>
             <a:ext cx="634166" cy="854362"/>
           </a:xfrm>
           <a:prstGeom prst="rect">
@@ -5215,7 +5215,7 @@
       </p:pic>
       <p:pic>
         <p:nvPicPr>
-          <p:cNvPr id="97" name="Picture 21" descr="C:\Users\Han Htet\Documents\GitHub\HueHueBakersDozenSolitaire\HueHueBakersDozenSolitaire\HueHueBakersDozenSolitaireContent\ClubsQueen.bmp"/>
+          <p:cNvPr id="96" name="Picture 39" descr="C:\Users\Han Htet\Documents\GitHub\HueHueBakersDozenSolitaire\HueHueBakersDozenSolitaire\HueHueBakersDozenSolitaireContent\DiamondsTwo.bmp"/>
           <p:cNvPicPr>
             <a:picLocks noChangeAspect="1" noChangeArrowheads="1"/>
           </p:cNvPicPr>
@@ -5236,7 +5236,7 @@
         </p:blipFill>
         <p:spPr bwMode="auto">
           <a:xfrm>
-            <a:off x="1143000" y="3823853"/>
+            <a:off x="1935467" y="3863105"/>
             <a:ext cx="634166" cy="854362"/>
           </a:xfrm>
           <a:prstGeom prst="rect">
@@ -5256,7 +5256,7 @@
       </p:pic>
       <p:pic>
         <p:nvPicPr>
-          <p:cNvPr id="98" name="Picture 10" descr="C:\Users\Han Htet\Documents\GitHub\HueHueBakersDozenSolitaire\HueHueBakersDozenSolitaire\HueHueBakersDozenSolitaireContent\SpadesSix.bmp"/>
+          <p:cNvPr id="97" name="Picture 21" descr="C:\Users\Han Htet\Documents\GitHub\HueHueBakersDozenSolitaire\HueHueBakersDozenSolitaire\HueHueBakersDozenSolitaireContent\ClubsQueen.bmp"/>
           <p:cNvPicPr>
             <a:picLocks noChangeAspect="1" noChangeArrowheads="1"/>
           </p:cNvPicPr>
@@ -5277,7 +5277,7 @@
         </p:blipFill>
         <p:spPr bwMode="auto">
           <a:xfrm>
-            <a:off x="2163201" y="3252355"/>
+            <a:off x="1935467" y="4061109"/>
             <a:ext cx="634166" cy="854362"/>
           </a:xfrm>
           <a:prstGeom prst="rect">
@@ -5297,7 +5297,7 @@
       </p:pic>
       <p:pic>
         <p:nvPicPr>
-          <p:cNvPr id="99" name="Picture 29" descr="C:\Users\Han Htet\Documents\GitHub\HueHueBakersDozenSolitaire\HueHueBakersDozenSolitaire\HueHueBakersDozenSolitaireContent\DiamondsFive.bmp"/>
+          <p:cNvPr id="98" name="Picture 10" descr="C:\Users\Han Htet\Documents\GitHub\HueHueBakersDozenSolitaire\HueHueBakersDozenSolitaire\HueHueBakersDozenSolitaireContent\SpadesSix.bmp"/>
           <p:cNvPicPr>
             <a:picLocks noChangeAspect="1" noChangeArrowheads="1"/>
           </p:cNvPicPr>
@@ -5318,7 +5318,7 @@
         </p:blipFill>
         <p:spPr bwMode="auto">
           <a:xfrm>
-            <a:off x="2163201" y="3576783"/>
+            <a:off x="2955668" y="3489611"/>
             <a:ext cx="634166" cy="854362"/>
           </a:xfrm>
           <a:prstGeom prst="rect">
@@ -5338,7 +5338,7 @@
       </p:pic>
       <p:pic>
         <p:nvPicPr>
-          <p:cNvPr id="100" name="Picture 44" descr="C:\Users\Han Htet\Documents\GitHub\HueHueBakersDozenSolitaire\HueHueBakersDozenSolitaire\HueHueBakersDozenSolitaireContent\HeartsJack.bmp"/>
+          <p:cNvPr id="99" name="Picture 29" descr="C:\Users\Han Htet\Documents\GitHub\HueHueBakersDozenSolitaire\HueHueBakersDozenSolitaire\HueHueBakersDozenSolitaireContent\DiamondsFive.bmp"/>
           <p:cNvPicPr>
             <a:picLocks noChangeAspect="1" noChangeArrowheads="1"/>
           </p:cNvPicPr>
@@ -5359,7 +5359,7 @@
         </p:blipFill>
         <p:spPr bwMode="auto">
           <a:xfrm>
-            <a:off x="2176735" y="3839439"/>
+            <a:off x="2955668" y="3814039"/>
             <a:ext cx="634166" cy="854362"/>
           </a:xfrm>
           <a:prstGeom prst="rect">
@@ -5379,7 +5379,7 @@
       </p:pic>
       <p:pic>
         <p:nvPicPr>
-          <p:cNvPr id="101" name="Picture 30" descr="C:\Users\Han Htet\Documents\GitHub\HueHueBakersDozenSolitaire\HueHueBakersDozenSolitaire\HueHueBakersDozenSolitaireContent\DiamondsFour.bmp"/>
+          <p:cNvPr id="100" name="Picture 44" descr="C:\Users\Han Htet\Documents\GitHub\HueHueBakersDozenSolitaire\HueHueBakersDozenSolitaire\HueHueBakersDozenSolitaireContent\HeartsJack.bmp"/>
           <p:cNvPicPr>
             <a:picLocks noChangeAspect="1" noChangeArrowheads="1"/>
           </p:cNvPicPr>
@@ -5400,7 +5400,7 @@
         </p:blipFill>
         <p:spPr bwMode="auto">
           <a:xfrm>
-            <a:off x="3313128" y="3327980"/>
+            <a:off x="2969202" y="4076695"/>
             <a:ext cx="634166" cy="854362"/>
           </a:xfrm>
           <a:prstGeom prst="rect">
@@ -5420,7 +5420,7 @@
       </p:pic>
       <p:pic>
         <p:nvPicPr>
-          <p:cNvPr id="102" name="Picture 7" descr="C:\Users\Han Htet\Documents\GitHub\HueHueBakersDozenSolitaire\HueHueBakersDozenSolitaire\HueHueBakersDozenSolitaireContent\SpadesNine.bmp"/>
+          <p:cNvPr id="101" name="Picture 30" descr="C:\Users\Han Htet\Documents\GitHub\HueHueBakersDozenSolitaire\HueHueBakersDozenSolitaire\HueHueBakersDozenSolitaireContent\DiamondsFour.bmp"/>
           <p:cNvPicPr>
             <a:picLocks noChangeAspect="1" noChangeArrowheads="1"/>
           </p:cNvPicPr>
@@ -5441,7 +5441,7 @@
         </p:blipFill>
         <p:spPr bwMode="auto">
           <a:xfrm>
-            <a:off x="3306201" y="3575627"/>
+            <a:off x="4045527" y="3573315"/>
             <a:ext cx="634166" cy="854362"/>
           </a:xfrm>
           <a:prstGeom prst="rect">
@@ -5461,7 +5461,7 @@
       </p:pic>
       <p:pic>
         <p:nvPicPr>
-          <p:cNvPr id="103" name="Picture 8" descr="C:\Users\Han Htet\Documents\GitHub\HueHueBakersDozenSolitaire\HueHueBakersDozenSolitaire\HueHueBakersDozenSolitaireContent\SpadesQueen.bmp"/>
+          <p:cNvPr id="102" name="Picture 7" descr="C:\Users\Han Htet\Documents\GitHub\HueHueBakersDozenSolitaire\HueHueBakersDozenSolitaire\HueHueBakersDozenSolitaireContent\SpadesNine.bmp"/>
           <p:cNvPicPr>
             <a:picLocks noChangeAspect="1" noChangeArrowheads="1"/>
           </p:cNvPicPr>
@@ -5482,7 +5482,7 @@
         </p:blipFill>
         <p:spPr bwMode="auto">
           <a:xfrm>
-            <a:off x="3313128" y="3833088"/>
+            <a:off x="4038600" y="3820962"/>
             <a:ext cx="634166" cy="854362"/>
           </a:xfrm>
           <a:prstGeom prst="rect">
@@ -5502,7 +5502,7 @@
       </p:pic>
       <p:pic>
         <p:nvPicPr>
-          <p:cNvPr id="104" name="Picture 42" descr="C:\Users\Han Htet\Documents\GitHub\HueHueBakersDozenSolitaire\HueHueBakersDozenSolitaire\HueHueBakersDozenSolitaireContent\HeartsFive.bmp"/>
+          <p:cNvPr id="103" name="Picture 8" descr="C:\Users\Han Htet\Documents\GitHub\HueHueBakersDozenSolitaire\HueHueBakersDozenSolitaire\HueHueBakersDozenSolitaireContent\SpadesQueen.bmp"/>
           <p:cNvPicPr>
             <a:picLocks noChangeAspect="1" noChangeArrowheads="1"/>
           </p:cNvPicPr>
@@ -5523,8 +5523,8 @@
         </p:blipFill>
         <p:spPr bwMode="auto">
           <a:xfrm>
-            <a:off x="4483517" y="3592366"/>
-            <a:ext cx="634166" cy="845554"/>
+            <a:off x="4045527" y="4078423"/>
+            <a:ext cx="634166" cy="854362"/>
           </a:xfrm>
           <a:prstGeom prst="rect">
             <a:avLst/>
@@ -5543,7 +5543,7 @@
       </p:pic>
       <p:pic>
         <p:nvPicPr>
-          <p:cNvPr id="105" name="Picture 5" descr="C:\Users\Han Htet\Documents\GitHub\HueHueBakersDozenSolitaire\HueHueBakersDozenSolitaire\HueHueBakersDozenSolitaireContent\SpadesJack.bmp"/>
+          <p:cNvPr id="104" name="Picture 42" descr="C:\Users\Han Htet\Documents\GitHub\HueHueBakersDozenSolitaire\HueHueBakersDozenSolitaire\HueHueBakersDozenSolitaireContent\HeartsFive.bmp"/>
           <p:cNvPicPr>
             <a:picLocks noChangeAspect="1" noChangeArrowheads="1"/>
           </p:cNvPicPr>
@@ -5564,8 +5564,8 @@
         </p:blipFill>
         <p:spPr bwMode="auto">
           <a:xfrm>
-            <a:off x="4483517" y="3849826"/>
-            <a:ext cx="634166" cy="854362"/>
+            <a:off x="5125573" y="3845208"/>
+            <a:ext cx="634166" cy="845554"/>
           </a:xfrm>
           <a:prstGeom prst="rect">
             <a:avLst/>
@@ -5584,7 +5584,7 @@
       </p:pic>
       <p:pic>
         <p:nvPicPr>
-          <p:cNvPr id="106" name="Picture 3" descr="C:\Users\Han Htet\Documents\GitHub\HueHueBakersDozenSolitaire\HueHueBakersDozenSolitaire\HueHueBakersDozenSolitaireContent\SpadesFive.bmp"/>
+          <p:cNvPr id="105" name="Picture 5" descr="C:\Users\Han Htet\Documents\GitHub\HueHueBakersDozenSolitaire\HueHueBakersDozenSolitaire\HueHueBakersDozenSolitaireContent\SpadesJack.bmp"/>
           <p:cNvPicPr>
             <a:picLocks noChangeAspect="1" noChangeArrowheads="1"/>
           </p:cNvPicPr>
@@ -5605,7 +5605,7 @@
         </p:blipFill>
         <p:spPr bwMode="auto">
           <a:xfrm>
-            <a:off x="5517894" y="3232728"/>
+            <a:off x="5125573" y="4102668"/>
             <a:ext cx="634166" cy="854362"/>
           </a:xfrm>
           <a:prstGeom prst="rect">
@@ -5625,7 +5625,7 @@
       </p:pic>
       <p:pic>
         <p:nvPicPr>
-          <p:cNvPr id="107" name="Picture 47" descr="C:\Users\Han Htet\Documents\GitHub\HueHueBakersDozenSolitaire\HueHueBakersDozenSolitaire\HueHueBakersDozenSolitaireContent\HeartsQueen.bmp"/>
+          <p:cNvPr id="106" name="Picture 3" descr="C:\Users\Han Htet\Documents\GitHub\HueHueBakersDozenSolitaire\HueHueBakersDozenSolitaire\HueHueBakersDozenSolitaireContent\SpadesFive.bmp"/>
           <p:cNvPicPr>
             <a:picLocks noChangeAspect="1" noChangeArrowheads="1"/>
           </p:cNvPicPr>
@@ -5646,7 +5646,7 @@
         </p:blipFill>
         <p:spPr bwMode="auto">
           <a:xfrm>
-            <a:off x="5517894" y="3585441"/>
+            <a:off x="6159950" y="3485570"/>
             <a:ext cx="634166" cy="854362"/>
           </a:xfrm>
           <a:prstGeom prst="rect">
@@ -5666,14 +5666,14 @@
       </p:pic>
       <p:pic>
         <p:nvPicPr>
-          <p:cNvPr id="1026" name="Picture 2" descr="C:\Users\Han Htet\Documents\GitHub\HueHueBakersDozenSolitaire\HueHueBakersDozenSolitaire\HueHueBakersDozenSolitaireContent\ClubsFour.bmp"/>
+          <p:cNvPr id="107" name="Picture 47" descr="C:\Users\Han Htet\Documents\GitHub\HueHueBakersDozenSolitaire\HueHueBakersDozenSolitaire\HueHueBakersDozenSolitaireContent\HeartsQueen.bmp"/>
           <p:cNvPicPr>
             <a:picLocks noChangeAspect="1" noChangeArrowheads="1"/>
           </p:cNvPicPr>
           <p:nvPr/>
         </p:nvPicPr>
         <p:blipFill>
-          <a:blip r:embed="rId11">
+          <a:blip r:embed="rId55">
             <a:extLst>
               <a:ext uri="{28A0092B-C50C-407E-A947-70E740481C1C}">
                 <a14:useLocalDpi xmlns:a14="http://schemas.microsoft.com/office/drawing/2010/main" val="0"/>
@@ -5687,8 +5687,49 @@
         </p:blipFill>
         <p:spPr bwMode="auto">
           <a:xfrm>
-            <a:off x="5518073" y="3839439"/>
-            <a:ext cx="692869" cy="933448"/>
+            <a:off x="6159950" y="3838283"/>
+            <a:ext cx="634166" cy="854362"/>
+          </a:xfrm>
+          <a:prstGeom prst="rect">
+            <a:avLst/>
+          </a:prstGeom>
+          <a:noFill/>
+          <a:extLst>
+            <a:ext uri="{909E8E84-426E-40DD-AFC4-6F175D3DCCD1}">
+              <a14:hiddenFill xmlns:a14="http://schemas.microsoft.com/office/drawing/2010/main">
+                <a:solidFill>
+                  <a:srgbClr val="FFFFFF"/>
+                </a:solidFill>
+              </a14:hiddenFill>
+            </a:ext>
+          </a:extLst>
+        </p:spPr>
+      </p:pic>
+      <p:pic>
+        <p:nvPicPr>
+          <p:cNvPr id="1026" name="Picture 2" descr="C:\Users\Han Htet\Documents\GitHub\HueHueBakersDozenSolitaire\HueHueBakersDozenSolitaire\HueHueBakersDozenSolitaireContent\ClubsFour.bmp"/>
+          <p:cNvPicPr>
+            <a:picLocks noChangeAspect="1" noChangeArrowheads="1"/>
+          </p:cNvPicPr>
+          <p:nvPr/>
+        </p:nvPicPr>
+        <p:blipFill>
+          <a:blip r:embed="rId12">
+            <a:extLst>
+              <a:ext uri="{28A0092B-C50C-407E-A947-70E740481C1C}">
+                <a14:useLocalDpi xmlns:a14="http://schemas.microsoft.com/office/drawing/2010/main" val="0"/>
+              </a:ext>
+            </a:extLst>
+          </a:blip>
+          <a:srcRect/>
+          <a:stretch>
+            <a:fillRect/>
+          </a:stretch>
+        </p:blipFill>
+        <p:spPr bwMode="auto">
+          <a:xfrm>
+            <a:off x="6160130" y="4092281"/>
+            <a:ext cx="641876" cy="864749"/>
           </a:xfrm>
           <a:prstGeom prst="rect">
             <a:avLst/>

</xml_diff>

<commit_message>
Made minor change to prototype.
</commit_message>
<xml_diff>
--- a/HueHueBakersDozenSolitaire/HueHueBakersDozenSolitaireContent/Prototype.pptx
+++ b/HueHueBakersDozenSolitaire/HueHueBakersDozenSolitaireContent/Prototype.pptx
@@ -119,7 +119,7 @@
   </p:defaultTextStyle>
   <p:extLst>
     <p:ext uri="{EFAFB233-063F-42B5-8137-9DF3F51BA10A}">
-      <p15:sldGuideLst xmlns:p15="http://schemas.microsoft.com/office/powerpoint/2012/main">
+      <p15:sldGuideLst xmlns:p15="http://schemas.microsoft.com/office/powerpoint/2012/main" xmlns="">
         <p15:guide id="1" orient="horz" pos="1620">
           <p15:clr>
             <a:srgbClr val="A4A3A4"/>
@@ -218,7 +218,7 @@
           <a:p>
             <a:fld id="{6236B3B6-7641-435A-B574-73CCDA61DBE3}" type="datetimeFigureOut">
               <a:rPr lang="en-US" smtClean="0"/>
-              <a:t>10/19/2013</a:t>
+              <a:t>10/20/2013</a:t>
             </a:fld>
             <a:endParaRPr lang="en-US"/>
           </a:p>
@@ -1691,7 +1691,7 @@
           <a:p>
             <a:fld id="{F1725567-5787-4BFE-8011-94626233B7DC}" type="datetimeFigureOut">
               <a:rPr lang="en-US" smtClean="0"/>
-              <a:t>10/19/2013</a:t>
+              <a:t>10/20/2013</a:t>
             </a:fld>
             <a:endParaRPr lang="en-US"/>
           </a:p>
@@ -1861,7 +1861,7 @@
           <a:p>
             <a:fld id="{F1725567-5787-4BFE-8011-94626233B7DC}" type="datetimeFigureOut">
               <a:rPr lang="en-US" smtClean="0"/>
-              <a:t>10/19/2013</a:t>
+              <a:t>10/20/2013</a:t>
             </a:fld>
             <a:endParaRPr lang="en-US"/>
           </a:p>
@@ -2041,7 +2041,7 @@
           <a:p>
             <a:fld id="{F1725567-5787-4BFE-8011-94626233B7DC}" type="datetimeFigureOut">
               <a:rPr lang="en-US" smtClean="0"/>
-              <a:t>10/19/2013</a:t>
+              <a:t>10/20/2013</a:t>
             </a:fld>
             <a:endParaRPr lang="en-US"/>
           </a:p>
@@ -2211,7 +2211,7 @@
           <a:p>
             <a:fld id="{F1725567-5787-4BFE-8011-94626233B7DC}" type="datetimeFigureOut">
               <a:rPr lang="en-US" smtClean="0"/>
-              <a:t>10/19/2013</a:t>
+              <a:t>10/20/2013</a:t>
             </a:fld>
             <a:endParaRPr lang="en-US"/>
           </a:p>
@@ -2457,7 +2457,7 @@
           <a:p>
             <a:fld id="{F1725567-5787-4BFE-8011-94626233B7DC}" type="datetimeFigureOut">
               <a:rPr lang="en-US" smtClean="0"/>
-              <a:t>10/19/2013</a:t>
+              <a:t>10/20/2013</a:t>
             </a:fld>
             <a:endParaRPr lang="en-US"/>
           </a:p>
@@ -2745,7 +2745,7 @@
           <a:p>
             <a:fld id="{F1725567-5787-4BFE-8011-94626233B7DC}" type="datetimeFigureOut">
               <a:rPr lang="en-US" smtClean="0"/>
-              <a:t>10/19/2013</a:t>
+              <a:t>10/20/2013</a:t>
             </a:fld>
             <a:endParaRPr lang="en-US"/>
           </a:p>
@@ -3167,7 +3167,7 @@
           <a:p>
             <a:fld id="{F1725567-5787-4BFE-8011-94626233B7DC}" type="datetimeFigureOut">
               <a:rPr lang="en-US" smtClean="0"/>
-              <a:t>10/19/2013</a:t>
+              <a:t>10/20/2013</a:t>
             </a:fld>
             <a:endParaRPr lang="en-US"/>
           </a:p>
@@ -3285,7 +3285,7 @@
           <a:p>
             <a:fld id="{F1725567-5787-4BFE-8011-94626233B7DC}" type="datetimeFigureOut">
               <a:rPr lang="en-US" smtClean="0"/>
-              <a:t>10/19/2013</a:t>
+              <a:t>10/20/2013</a:t>
             </a:fld>
             <a:endParaRPr lang="en-US"/>
           </a:p>
@@ -3380,7 +3380,7 @@
           <a:p>
             <a:fld id="{F1725567-5787-4BFE-8011-94626233B7DC}" type="datetimeFigureOut">
               <a:rPr lang="en-US" smtClean="0"/>
-              <a:t>10/19/2013</a:t>
+              <a:t>10/20/2013</a:t>
             </a:fld>
             <a:endParaRPr lang="en-US"/>
           </a:p>
@@ -3657,7 +3657,7 @@
           <a:p>
             <a:fld id="{F1725567-5787-4BFE-8011-94626233B7DC}" type="datetimeFigureOut">
               <a:rPr lang="en-US" smtClean="0"/>
-              <a:t>10/19/2013</a:t>
+              <a:t>10/20/2013</a:t>
             </a:fld>
             <a:endParaRPr lang="en-US"/>
           </a:p>
@@ -3910,7 +3910,7 @@
           <a:p>
             <a:fld id="{F1725567-5787-4BFE-8011-94626233B7DC}" type="datetimeFigureOut">
               <a:rPr lang="en-US" smtClean="0"/>
-              <a:t>10/19/2013</a:t>
+              <a:t>10/20/2013</a:t>
             </a:fld>
             <a:endParaRPr lang="en-US"/>
           </a:p>
@@ -4123,7 +4123,7 @@
           <a:p>
             <a:fld id="{F1725567-5787-4BFE-8011-94626233B7DC}" type="datetimeFigureOut">
               <a:rPr lang="en-US" smtClean="0"/>
-              <a:t>10/19/2013</a:t>
+              <a:t>10/20/2013</a:t>
             </a:fld>
             <a:endParaRPr lang="en-US"/>
           </a:p>
@@ -6752,11 +6752,11 @@
   <p:clrMapOvr>
     <a:masterClrMapping/>
   </p:clrMapOvr>
-  <mc:AlternateContent xmlns:mc="http://schemas.openxmlformats.org/markup-compatibility/2006">
-    <mc:Choice xmlns:p14="http://schemas.microsoft.com/office/powerpoint/2010/main" Requires="p14">
+  <mc:AlternateContent xmlns:mc="http://schemas.openxmlformats.org/markup-compatibility/2006" xmlns:p14="http://schemas.microsoft.com/office/powerpoint/2010/main">
+    <mc:Choice Requires="p14">
       <p:transition spd="slow" p14:dur="2000" advClick="0" advTm="5000"/>
     </mc:Choice>
-    <mc:Fallback>
+    <mc:Fallback xmlns="">
       <p:transition spd="slow" advClick="0" advTm="5000"/>
     </mc:Fallback>
   </mc:AlternateContent>
@@ -7032,13 +7032,13 @@
   <p:clrMapOvr>
     <a:masterClrMapping/>
   </p:clrMapOvr>
-  <mc:AlternateContent xmlns:mc="http://schemas.openxmlformats.org/markup-compatibility/2006">
-    <mc:Choice xmlns:p14="http://schemas.microsoft.com/office/powerpoint/2010/main" Requires="p14">
+  <mc:AlternateContent xmlns:mc="http://schemas.openxmlformats.org/markup-compatibility/2006" xmlns:p14="http://schemas.microsoft.com/office/powerpoint/2010/main">
+    <mc:Choice Requires="p14">
       <p:transition spd="med" p14:dur="700" advClick="0" advTm="3000">
         <p:fade/>
       </p:transition>
     </mc:Choice>
-    <mc:Fallback>
+    <mc:Fallback xmlns="">
       <p:transition spd="med" advClick="0" advTm="3000">
         <p:fade/>
       </p:transition>
@@ -8098,13 +8098,13 @@
   <p:clrMapOvr>
     <a:masterClrMapping/>
   </p:clrMapOvr>
-  <mc:AlternateContent xmlns:mc="http://schemas.openxmlformats.org/markup-compatibility/2006">
-    <mc:Choice xmlns:p14="http://schemas.microsoft.com/office/powerpoint/2010/main" Requires="p14">
+  <mc:AlternateContent xmlns:mc="http://schemas.openxmlformats.org/markup-compatibility/2006" xmlns:p14="http://schemas.microsoft.com/office/powerpoint/2010/main">
+    <mc:Choice Requires="p14">
       <p:transition spd="med" p14:dur="700">
         <p:fade/>
       </p:transition>
     </mc:Choice>
-    <mc:Fallback>
+    <mc:Fallback xmlns="">
       <p:transition spd="med">
         <p:fade/>
       </p:transition>
@@ -11360,11 +11360,11 @@
   <p:clrMapOvr>
     <a:masterClrMapping/>
   </p:clrMapOvr>
-  <mc:AlternateContent xmlns:mc="http://schemas.openxmlformats.org/markup-compatibility/2006">
-    <mc:Choice xmlns:p14="http://schemas.microsoft.com/office/powerpoint/2010/main" Requires="p14">
+  <mc:AlternateContent xmlns:mc="http://schemas.openxmlformats.org/markup-compatibility/2006" xmlns:p14="http://schemas.microsoft.com/office/powerpoint/2010/main">
+    <mc:Choice Requires="p14">
       <p:transition spd="slow" p14:dur="2000" advClick="0" advTm="5000"/>
     </mc:Choice>
-    <mc:Fallback>
+    <mc:Fallback xmlns="">
       <p:transition spd="slow" advClick="0" advTm="5000"/>
     </mc:Fallback>
   </mc:AlternateContent>
@@ -13817,11 +13817,11 @@
   <p:clrMapOvr>
     <a:masterClrMapping/>
   </p:clrMapOvr>
-  <mc:AlternateContent xmlns:mc="http://schemas.openxmlformats.org/markup-compatibility/2006">
-    <mc:Choice xmlns:p14="http://schemas.microsoft.com/office/powerpoint/2010/main" Requires="p14">
+  <mc:AlternateContent xmlns:mc="http://schemas.openxmlformats.org/markup-compatibility/2006" xmlns:p14="http://schemas.microsoft.com/office/powerpoint/2010/main">
+    <mc:Choice Requires="p14">
       <p:transition spd="slow" p14:dur="2000" advClick="0" advTm="2000"/>
     </mc:Choice>
-    <mc:Fallback>
+    <mc:Fallback xmlns="">
       <p:transition spd="slow" advClick="0" advTm="2000"/>
     </mc:Fallback>
   </mc:AlternateContent>
@@ -16274,11 +16274,11 @@
   <p:clrMapOvr>
     <a:masterClrMapping/>
   </p:clrMapOvr>
-  <mc:AlternateContent xmlns:mc="http://schemas.openxmlformats.org/markup-compatibility/2006">
-    <mc:Choice xmlns:p14="http://schemas.microsoft.com/office/powerpoint/2010/main" Requires="p14">
+  <mc:AlternateContent xmlns:mc="http://schemas.openxmlformats.org/markup-compatibility/2006" xmlns:p14="http://schemas.microsoft.com/office/powerpoint/2010/main">
+    <mc:Choice Requires="p14">
       <p:transition spd="slow" p14:dur="2000" advClick="0" advTm="5000"/>
     </mc:Choice>
-    <mc:Fallback>
+    <mc:Fallback xmlns="">
       <p:transition spd="slow" advClick="0" advTm="5000"/>
     </mc:Fallback>
   </mc:AlternateContent>
@@ -18665,11 +18665,11 @@
   <p:clrMapOvr>
     <a:masterClrMapping/>
   </p:clrMapOvr>
-  <mc:AlternateContent xmlns:mc="http://schemas.openxmlformats.org/markup-compatibility/2006">
-    <mc:Choice xmlns:p14="http://schemas.microsoft.com/office/powerpoint/2010/main" Requires="p14">
+  <mc:AlternateContent xmlns:mc="http://schemas.openxmlformats.org/markup-compatibility/2006" xmlns:p14="http://schemas.microsoft.com/office/powerpoint/2010/main">
+    <mc:Choice Requires="p14">
       <p:transition spd="slow" p14:dur="2000" advClick="0" advTm="5000"/>
     </mc:Choice>
-    <mc:Fallback>
+    <mc:Fallback xmlns="">
       <p:transition spd="slow" advClick="0" advTm="5000"/>
     </mc:Fallback>
   </mc:AlternateContent>
@@ -21122,11 +21122,11 @@
   <p:clrMapOvr>
     <a:masterClrMapping/>
   </p:clrMapOvr>
-  <mc:AlternateContent xmlns:mc="http://schemas.openxmlformats.org/markup-compatibility/2006">
-    <mc:Choice xmlns:p14="http://schemas.microsoft.com/office/powerpoint/2010/main" Requires="p14">
+  <mc:AlternateContent xmlns:mc="http://schemas.openxmlformats.org/markup-compatibility/2006" xmlns:p14="http://schemas.microsoft.com/office/powerpoint/2010/main">
+    <mc:Choice Requires="p14">
       <p:transition spd="slow" p14:dur="2000" advClick="0" advTm="5000"/>
     </mc:Choice>
-    <mc:Fallback>
+    <mc:Fallback xmlns="">
       <p:transition spd="slow" advClick="0" advTm="5000"/>
     </mc:Fallback>
   </mc:AlternateContent>
@@ -23579,11 +23579,11 @@
   <p:clrMapOvr>
     <a:masterClrMapping/>
   </p:clrMapOvr>
-  <mc:AlternateContent xmlns:mc="http://schemas.openxmlformats.org/markup-compatibility/2006">
-    <mc:Choice xmlns:p14="http://schemas.microsoft.com/office/powerpoint/2010/main" Requires="p14">
+  <mc:AlternateContent xmlns:mc="http://schemas.openxmlformats.org/markup-compatibility/2006" xmlns:p14="http://schemas.microsoft.com/office/powerpoint/2010/main">
+    <mc:Choice Requires="p14">
       <p:transition spd="slow" p14:dur="2000" advClick="0" advTm="3000"/>
     </mc:Choice>
-    <mc:Fallback>
+    <mc:Fallback xmlns="">
       <p:transition spd="slow" advClick="0" advTm="3000"/>
     </mc:Fallback>
   </mc:AlternateContent>
@@ -26036,11 +26036,11 @@
   <p:clrMapOvr>
     <a:masterClrMapping/>
   </p:clrMapOvr>
-  <mc:AlternateContent xmlns:mc="http://schemas.openxmlformats.org/markup-compatibility/2006">
-    <mc:Choice xmlns:p14="http://schemas.microsoft.com/office/powerpoint/2010/main" Requires="p14">
+  <mc:AlternateContent xmlns:mc="http://schemas.openxmlformats.org/markup-compatibility/2006" xmlns:p14="http://schemas.microsoft.com/office/powerpoint/2010/main">
+    <mc:Choice Requires="p14">
       <p:transition spd="slow" p14:dur="2000" advClick="0" advTm="5000"/>
     </mc:Choice>
-    <mc:Fallback>
+    <mc:Fallback xmlns="">
       <p:transition spd="slow" advClick="0" advTm="5000"/>
     </mc:Fallback>
   </mc:AlternateContent>
@@ -26180,6 +26180,47 @@
       </p:pic>
       <p:pic>
         <p:nvPicPr>
+          <p:cNvPr id="1026" name="Picture 2" descr="C:\Users\Han Htet\Documents\GitHub\HueHueBakersDozenSolitaire\HueHueBakersDozenSolitaire\HueHueBakersDozenSolitaireContent\HeartsQueen.bmp"/>
+          <p:cNvPicPr>
+            <a:picLocks noChangeAspect="1" noChangeArrowheads="1"/>
+          </p:cNvPicPr>
+          <p:nvPr/>
+        </p:nvPicPr>
+        <p:blipFill>
+          <a:blip r:embed="rId4">
+            <a:extLst>
+              <a:ext uri="{28A0092B-C50C-407E-A947-70E740481C1C}">
+                <a14:useLocalDpi xmlns:a14="http://schemas.microsoft.com/office/drawing/2010/main" val="0"/>
+              </a:ext>
+            </a:extLst>
+          </a:blip>
+          <a:srcRect/>
+          <a:stretch>
+            <a:fillRect/>
+          </a:stretch>
+        </p:blipFill>
+        <p:spPr bwMode="auto">
+          <a:xfrm>
+            <a:off x="8168811" y="538589"/>
+            <a:ext cx="660739" cy="890162"/>
+          </a:xfrm>
+          <a:prstGeom prst="rect">
+            <a:avLst/>
+          </a:prstGeom>
+          <a:noFill/>
+          <a:extLst>
+            <a:ext uri="{909E8E84-426E-40DD-AFC4-6F175D3DCCD1}">
+              <a14:hiddenFill xmlns:a14="http://schemas.microsoft.com/office/drawing/2010/main">
+                <a:solidFill>
+                  <a:srgbClr val="FFFFFF"/>
+                </a:solidFill>
+              </a14:hiddenFill>
+            </a:ext>
+          </a:extLst>
+        </p:spPr>
+      </p:pic>
+      <p:pic>
+        <p:nvPicPr>
           <p:cNvPr id="56" name="Picture 32" descr="C:\Users\Han Htet\Documents\GitHub\HueHueBakersDozenSolitaire\HueHueBakersDozenSolitaire\HueHueBakersDozenSolitaireContent\DiamondsKing.bmp"/>
           <p:cNvPicPr>
             <a:picLocks noChangeAspect="1" noChangeArrowheads="1"/>
@@ -26187,7 +26228,7 @@
           <p:nvPr/>
         </p:nvPicPr>
         <p:blipFill>
-          <a:blip r:embed="rId4">
+          <a:blip r:embed="rId5">
             <a:extLst>
               <a:ext uri="{28A0092B-C50C-407E-A947-70E740481C1C}">
                 <a14:useLocalDpi xmlns:a14="http://schemas.microsoft.com/office/drawing/2010/main" val="0"/>
@@ -26228,7 +26269,7 @@
           <p:nvPr/>
         </p:nvPicPr>
         <p:blipFill>
-          <a:blip r:embed="rId5">
+          <a:blip r:embed="rId6">
             <a:extLst>
               <a:ext uri="{28A0092B-C50C-407E-A947-70E740481C1C}">
                 <a14:useLocalDpi xmlns:a14="http://schemas.microsoft.com/office/drawing/2010/main" val="0"/>
@@ -26269,7 +26310,7 @@
           <p:nvPr/>
         </p:nvPicPr>
         <p:blipFill>
-          <a:blip r:embed="rId6">
+          <a:blip r:embed="rId7">
             <a:extLst>
               <a:ext uri="{28A0092B-C50C-407E-A947-70E740481C1C}">
                 <a14:useLocalDpi xmlns:a14="http://schemas.microsoft.com/office/drawing/2010/main" val="0"/>
@@ -26310,7 +26351,7 @@
           <p:nvPr/>
         </p:nvPicPr>
         <p:blipFill>
-          <a:blip r:embed="rId7">
+          <a:blip r:embed="rId8">
             <a:extLst>
               <a:ext uri="{28A0092B-C50C-407E-A947-70E740481C1C}">
                 <a14:useLocalDpi xmlns:a14="http://schemas.microsoft.com/office/drawing/2010/main" val="0"/>
@@ -26351,11 +26392,11 @@
           <p:nvPr/>
         </p:nvPicPr>
         <p:blipFill>
-          <a:blip r:embed="rId8">
+          <a:blip r:embed="rId9">
             <a:extLst>
               <a:ext uri="{BEBA8EAE-BF5A-486C-A8C5-ECC9F3942E4B}">
                 <a14:imgProps xmlns:a14="http://schemas.microsoft.com/office/drawing/2010/main">
-                  <a14:imgLayer r:embed="rId9">
+                  <a14:imgLayer r:embed="rId10">
                     <a14:imgEffect>
                       <a14:backgroundRemoval t="9548" b="94472" l="10000" r="90000"/>
                     </a14:imgEffect>
@@ -26418,13 +26459,13 @@
   <p:clrMapOvr>
     <a:masterClrMapping/>
   </p:clrMapOvr>
-  <mc:AlternateContent xmlns:mc="http://schemas.openxmlformats.org/markup-compatibility/2006">
-    <mc:Choice xmlns:p14="http://schemas.microsoft.com/office/powerpoint/2010/main" Requires="p14">
+  <mc:AlternateContent xmlns:mc="http://schemas.openxmlformats.org/markup-compatibility/2006" xmlns:p14="http://schemas.microsoft.com/office/powerpoint/2010/main">
+    <mc:Choice Requires="p14">
       <p:transition spd="med" p14:dur="700" advClick="0" advTm="3000">
         <p:fade/>
       </p:transition>
     </mc:Choice>
-    <mc:Fallback>
+    <mc:Fallback xmlns="">
       <p:transition spd="med" advClick="0" advTm="3000">
         <p:fade/>
       </p:transition>

</xml_diff>

<commit_message>
Changed font and coloring of text in prototype
</commit_message>
<xml_diff>
--- a/HueHueBakersDozenSolitaire/HueHueBakersDozenSolitaireContent/Prototype.pptx
+++ b/HueHueBakersDozenSolitaire/HueHueBakersDozenSolitaireContent/Prototype.pptx
@@ -6721,7 +6721,7 @@
         <p:spPr>
           <a:xfrm>
             <a:off x="76200" y="80246"/>
-            <a:ext cx="9067801" cy="369332"/>
+            <a:ext cx="9067801" cy="353943"/>
           </a:xfrm>
           <a:prstGeom prst="rect">
             <a:avLst/>
@@ -6735,10 +6735,24 @@
           <a:lstStyle/>
           <a:p>
             <a:r>
-              <a:rPr lang="en-US" dirty="0" smtClean="0"/>
+              <a:rPr lang="en-US" sz="1700" dirty="0" smtClean="0">
+                <a:solidFill>
+                  <a:schemeClr val="bg1">
+                    <a:lumMod val="95000"/>
+                  </a:schemeClr>
+                </a:solidFill>
+                <a:latin typeface="Candara" panose="020E0502030303020204" pitchFamily="34" charset="0"/>
+              </a:rPr>
               <a:t>Initial Setup. 13 piles of 4 cards each, where all kings are at the bottom of their respective piles.</a:t>
             </a:r>
-            <a:endParaRPr lang="en-US" dirty="0"/>
+            <a:endParaRPr lang="en-US" sz="1700" dirty="0">
+              <a:solidFill>
+                <a:schemeClr val="bg1">
+                  <a:lumMod val="95000"/>
+                </a:schemeClr>
+              </a:solidFill>
+              <a:latin typeface="Candara" panose="020E0502030303020204" pitchFamily="34" charset="0"/>
+            </a:endParaRPr>
           </a:p>
         </p:txBody>
       </p:sp>
@@ -11329,7 +11343,7 @@
         <p:spPr>
           <a:xfrm>
             <a:off x="76200" y="80246"/>
-            <a:ext cx="3893127" cy="369332"/>
+            <a:ext cx="5366456" cy="369332"/>
           </a:xfrm>
           <a:prstGeom prst="rect">
             <a:avLst/>
@@ -11343,10 +11357,24 @@
           <a:lstStyle/>
           <a:p>
             <a:r>
-              <a:rPr lang="en-US" dirty="0" smtClean="0"/>
+              <a:rPr lang="en-US" dirty="0" smtClean="0">
+                <a:solidFill>
+                  <a:schemeClr val="bg1">
+                    <a:lumMod val="95000"/>
+                  </a:schemeClr>
+                </a:solidFill>
+                <a:latin typeface="Candara" panose="020E0502030303020204" pitchFamily="34" charset="0"/>
+              </a:rPr>
               <a:t>Moving a card from one pile to another.</a:t>
             </a:r>
-            <a:endParaRPr lang="en-US" dirty="0"/>
+            <a:endParaRPr lang="en-US" dirty="0">
+              <a:solidFill>
+                <a:schemeClr val="bg1">
+                  <a:lumMod val="95000"/>
+                </a:schemeClr>
+              </a:solidFill>
+              <a:latin typeface="Candara" panose="020E0502030303020204" pitchFamily="34" charset="0"/>
+            </a:endParaRPr>
           </a:p>
         </p:txBody>
       </p:sp>
@@ -13800,10 +13828,24 @@
           <a:lstStyle/>
           <a:p>
             <a:r>
-              <a:rPr lang="en-US" dirty="0" smtClean="0"/>
+              <a:rPr lang="en-US" dirty="0" smtClean="0">
+                <a:solidFill>
+                  <a:schemeClr val="bg1">
+                    <a:lumMod val="95000"/>
+                  </a:schemeClr>
+                </a:solidFill>
+                <a:latin typeface="Candara" panose="020E0502030303020204" pitchFamily="34" charset="0"/>
+              </a:rPr>
               <a:t>Moving from one pile to another and getting rejected due to incorrect hierarchical order.</a:t>
             </a:r>
-            <a:endParaRPr lang="en-US" dirty="0"/>
+            <a:endParaRPr lang="en-US" dirty="0">
+              <a:solidFill>
+                <a:schemeClr val="bg1">
+                  <a:lumMod val="95000"/>
+                </a:schemeClr>
+              </a:solidFill>
+              <a:latin typeface="Candara" panose="020E0502030303020204" pitchFamily="34" charset="0"/>
+            </a:endParaRPr>
           </a:p>
         </p:txBody>
       </p:sp>
@@ -16257,10 +16299,24 @@
           <a:lstStyle/>
           <a:p>
             <a:r>
-              <a:rPr lang="en-US" dirty="0" smtClean="0"/>
+              <a:rPr lang="en-US" dirty="0" smtClean="0">
+                <a:solidFill>
+                  <a:schemeClr val="bg1">
+                    <a:lumMod val="95000"/>
+                  </a:schemeClr>
+                </a:solidFill>
+                <a:latin typeface="Candara" panose="020E0502030303020204" pitchFamily="34" charset="0"/>
+              </a:rPr>
               <a:t>Moving from one pile to another and getting rejected due to incorrect hierarchical order.</a:t>
             </a:r>
-            <a:endParaRPr lang="en-US" dirty="0"/>
+            <a:endParaRPr lang="en-US" dirty="0">
+              <a:solidFill>
+                <a:schemeClr val="bg1">
+                  <a:lumMod val="95000"/>
+                </a:schemeClr>
+              </a:solidFill>
+              <a:latin typeface="Candara" panose="020E0502030303020204" pitchFamily="34" charset="0"/>
+            </a:endParaRPr>
           </a:p>
         </p:txBody>
       </p:sp>
@@ -18648,10 +18704,24 @@
           <a:lstStyle/>
           <a:p>
             <a:r>
-              <a:rPr lang="en-US" dirty="0" smtClean="0"/>
+              <a:rPr lang="en-US" dirty="0" smtClean="0">
+                <a:solidFill>
+                  <a:schemeClr val="bg1">
+                    <a:lumMod val="95000"/>
+                  </a:schemeClr>
+                </a:solidFill>
+                <a:latin typeface="Candara" panose="020E0502030303020204" pitchFamily="34" charset="0"/>
+              </a:rPr>
               <a:t>Moving to an empty Foundation. (Aces Only)</a:t>
             </a:r>
-            <a:endParaRPr lang="en-US" dirty="0"/>
+            <a:endParaRPr lang="en-US" dirty="0">
+              <a:solidFill>
+                <a:schemeClr val="bg1">
+                  <a:lumMod val="95000"/>
+                </a:schemeClr>
+              </a:solidFill>
+              <a:latin typeface="Candara" panose="020E0502030303020204" pitchFamily="34" charset="0"/>
+            </a:endParaRPr>
           </a:p>
         </p:txBody>
       </p:sp>
@@ -21105,10 +21175,24 @@
           <a:lstStyle/>
           <a:p>
             <a:r>
-              <a:rPr lang="en-US" dirty="0" smtClean="0"/>
+              <a:rPr lang="en-US" dirty="0" smtClean="0">
+                <a:solidFill>
+                  <a:schemeClr val="bg1">
+                    <a:lumMod val="95000"/>
+                  </a:schemeClr>
+                </a:solidFill>
+                <a:latin typeface="Candara" panose="020E0502030303020204" pitchFamily="34" charset="0"/>
+              </a:rPr>
               <a:t>Moving a card to a foundation of the same suit in hierarchical order.</a:t>
             </a:r>
-            <a:endParaRPr lang="en-US" dirty="0"/>
+            <a:endParaRPr lang="en-US" dirty="0">
+              <a:solidFill>
+                <a:schemeClr val="bg1">
+                  <a:lumMod val="95000"/>
+                </a:schemeClr>
+              </a:solidFill>
+              <a:latin typeface="Candara" panose="020E0502030303020204" pitchFamily="34" charset="0"/>
+            </a:endParaRPr>
           </a:p>
         </p:txBody>
       </p:sp>
@@ -23562,10 +23646,24 @@
           <a:lstStyle/>
           <a:p>
             <a:r>
-              <a:rPr lang="en-US" dirty="0" smtClean="0"/>
+              <a:rPr lang="en-US" dirty="0" smtClean="0">
+                <a:solidFill>
+                  <a:schemeClr val="bg1">
+                    <a:lumMod val="95000"/>
+                  </a:schemeClr>
+                </a:solidFill>
+                <a:latin typeface="Candara" panose="020E0502030303020204" pitchFamily="34" charset="0"/>
+              </a:rPr>
               <a:t>Moving a card to an empty foundation when card is not an ace or of the same suit.</a:t>
             </a:r>
-            <a:endParaRPr lang="en-US" dirty="0"/>
+            <a:endParaRPr lang="en-US" dirty="0">
+              <a:solidFill>
+                <a:schemeClr val="bg1">
+                  <a:lumMod val="95000"/>
+                </a:schemeClr>
+              </a:solidFill>
+              <a:latin typeface="Candara" panose="020E0502030303020204" pitchFamily="34" charset="0"/>
+            </a:endParaRPr>
           </a:p>
         </p:txBody>
       </p:sp>
@@ -26019,10 +26117,24 @@
           <a:lstStyle/>
           <a:p>
             <a:r>
-              <a:rPr lang="en-US" dirty="0" smtClean="0"/>
+              <a:rPr lang="en-US" dirty="0" smtClean="0">
+                <a:solidFill>
+                  <a:schemeClr val="bg1">
+                    <a:lumMod val="95000"/>
+                  </a:schemeClr>
+                </a:solidFill>
+                <a:latin typeface="Candara" panose="020E0502030303020204" pitchFamily="34" charset="0"/>
+              </a:rPr>
               <a:t>Moving a card to an empty foundation when card is not an ace or of the same suit.</a:t>
             </a:r>
-            <a:endParaRPr lang="en-US" dirty="0"/>
+            <a:endParaRPr lang="en-US" dirty="0">
+              <a:solidFill>
+                <a:schemeClr val="bg1">
+                  <a:lumMod val="95000"/>
+                </a:schemeClr>
+              </a:solidFill>
+              <a:latin typeface="Candara" panose="020E0502030303020204" pitchFamily="34" charset="0"/>
+            </a:endParaRPr>
           </a:p>
         </p:txBody>
       </p:sp>
@@ -26442,10 +26554,24 @@
           <a:lstStyle/>
           <a:p>
             <a:r>
-              <a:rPr lang="en-US" dirty="0" smtClean="0"/>
+              <a:rPr lang="en-US" dirty="0" smtClean="0">
+                <a:solidFill>
+                  <a:schemeClr val="bg1">
+                    <a:lumMod val="95000"/>
+                  </a:schemeClr>
+                </a:solidFill>
+                <a:latin typeface="Candara" panose="020E0502030303020204" pitchFamily="34" charset="0"/>
+              </a:rPr>
               <a:t>Winning the Game.</a:t>
             </a:r>
-            <a:endParaRPr lang="en-US" dirty="0"/>
+            <a:endParaRPr lang="en-US" dirty="0">
+              <a:solidFill>
+                <a:schemeClr val="bg1">
+                  <a:lumMod val="95000"/>
+                </a:schemeClr>
+              </a:solidFill>
+              <a:latin typeface="Candara" panose="020E0502030303020204" pitchFamily="34" charset="0"/>
+            </a:endParaRPr>
           </a:p>
         </p:txBody>
       </p:sp>

</xml_diff>